<commit_message>
adds lecture slides for evm
</commit_message>
<xml_diff>
--- a/public/lecture-5-evm.pptx
+++ b/public/lecture-5-evm.pptx
@@ -5,10 +5,10 @@
     <p:sldMasterId id="2147483648" r:id="rId1"/>
   </p:sldMasterIdLst>
   <p:notesMasterIdLst>
-    <p:notesMasterId r:id="rId72"/>
+    <p:notesMasterId r:id="rId70"/>
   </p:notesMasterIdLst>
   <p:handoutMasterIdLst>
-    <p:handoutMasterId r:id="rId73"/>
+    <p:handoutMasterId r:id="rId71"/>
   </p:handoutMasterIdLst>
   <p:sldIdLst>
     <p:sldId id="1877" r:id="rId2"/>
@@ -73,39 +73,37 @@
     <p:sldId id="1610" r:id="rId61"/>
     <p:sldId id="1611" r:id="rId62"/>
     <p:sldId id="1612" r:id="rId63"/>
-    <p:sldId id="1613" r:id="rId64"/>
-    <p:sldId id="1615" r:id="rId65"/>
-    <p:sldId id="1878" r:id="rId66"/>
-    <p:sldId id="1616" r:id="rId67"/>
-    <p:sldId id="1617" r:id="rId68"/>
-    <p:sldId id="1618" r:id="rId69"/>
-    <p:sldId id="1603" r:id="rId70"/>
-    <p:sldId id="1619" r:id="rId71"/>
+    <p:sldId id="1615" r:id="rId64"/>
+    <p:sldId id="1878" r:id="rId65"/>
+    <p:sldId id="1616" r:id="rId66"/>
+    <p:sldId id="1617" r:id="rId67"/>
+    <p:sldId id="1603" r:id="rId68"/>
+    <p:sldId id="1619" r:id="rId69"/>
   </p:sldIdLst>
   <p:sldSz cx="9144000" cy="6858000" type="overhead"/>
   <p:notesSz cx="6858000" cy="9144000"/>
   <p:embeddedFontLst>
     <p:embeddedFont>
       <p:font typeface="Comic Sans MS" panose="030F0702030302020204" pitchFamily="66" charset="0"/>
-      <p:regular r:id="rId74"/>
-      <p:bold r:id="rId75"/>
-      <p:italic r:id="rId76"/>
-      <p:boldItalic r:id="rId77"/>
+      <p:regular r:id="rId72"/>
+      <p:bold r:id="rId73"/>
+      <p:italic r:id="rId74"/>
+      <p:boldItalic r:id="rId75"/>
     </p:embeddedFont>
     <p:embeddedFont>
       <p:font typeface="Consolas" panose="020B0609020204030204" pitchFamily="49" charset="0"/>
-      <p:regular r:id="rId78"/>
-      <p:bold r:id="rId79"/>
-      <p:italic r:id="rId80"/>
-      <p:boldItalic r:id="rId81"/>
+      <p:regular r:id="rId76"/>
+      <p:bold r:id="rId77"/>
+      <p:italic r:id="rId78"/>
+      <p:boldItalic r:id="rId79"/>
     </p:embeddedFont>
     <p:embeddedFont>
       <p:font typeface="Lucida Console" panose="020B0609040504020204" pitchFamily="49" charset="0"/>
-      <p:regular r:id="rId82"/>
+      <p:regular r:id="rId80"/>
     </p:embeddedFont>
     <p:embeddedFont>
       <p:font typeface="Marlett" pitchFamily="2" charset="2"/>
-      <p:regular r:id="rId83"/>
+      <p:regular r:id="rId81"/>
     </p:embeddedFont>
   </p:embeddedFontLst>
   <p:defaultTextStyle>
@@ -4044,20 +4042,14 @@
           <a:p>
             <a:pPr algn="ctr"/>
             <a:r>
-              <a:rPr lang="en-US" sz="2800" b="1">
+              <a:rPr lang="en-US" sz="2800" b="1" dirty="0">
                 <a:solidFill>
                   <a:srgbClr val="FFFF00"/>
                 </a:solidFill>
                 <a:latin typeface="Arial" panose="020B0604020202020204" pitchFamily="34" charset="0"/>
               </a:rPr>
-              <a:t>Spring 2024</a:t>
+              <a:t>Spring 2025</a:t>
             </a:r>
-            <a:endParaRPr lang="en-US" sz="2800" b="1" dirty="0">
-              <a:solidFill>
-                <a:srgbClr val="FFFF00"/>
-              </a:solidFill>
-              <a:latin typeface="Arial" panose="020B0604020202020204" pitchFamily="34" charset="0"/>
-            </a:endParaRPr>
           </a:p>
         </p:txBody>
       </p:sp>
@@ -12033,8 +12025,8 @@
         </p:nvSpPr>
         <p:spPr bwMode="auto">
           <a:xfrm>
-            <a:off x="4274685" y="2609731"/>
-            <a:ext cx="3107855" cy="510778"/>
+            <a:off x="4360465" y="2609731"/>
+            <a:ext cx="3022075" cy="510778"/>
           </a:xfrm>
           <a:prstGeom prst="wedgeRoundRectCallout">
             <a:avLst>
@@ -12092,8 +12084,33 @@
                 <a:latin typeface="Arial" panose="020B0604020202020204" pitchFamily="34" charset="0"/>
                 <a:cs typeface="Arial" panose="020B0604020202020204" pitchFamily="34" charset="0"/>
               </a:rPr>
-              <a:t>Associated with code</a:t>
+              <a:t>Has</a:t>
             </a:r>
+            <a:r>
+              <a:rPr kumimoji="0" lang="en-US" sz="2400" b="0" i="0" u="none" strike="noStrike" cap="none" normalizeH="0" dirty="0">
+                <a:ln>
+                  <a:noFill/>
+                </a:ln>
+                <a:solidFill>
+                  <a:srgbClr val="FFFF00"/>
+                </a:solidFill>
+                <a:effectLst/>
+                <a:latin typeface="Arial" panose="020B0604020202020204" pitchFamily="34" charset="0"/>
+                <a:cs typeface="Arial" panose="020B0604020202020204" pitchFamily="34" charset="0"/>
+              </a:rPr>
+              <a:t> immutable code</a:t>
+            </a:r>
+            <a:endParaRPr kumimoji="0" lang="en-US" sz="2400" b="0" i="0" u="none" strike="noStrike" cap="none" normalizeH="0" baseline="0" dirty="0">
+              <a:ln>
+                <a:noFill/>
+              </a:ln>
+              <a:solidFill>
+                <a:srgbClr val="FFFF00"/>
+              </a:solidFill>
+              <a:effectLst/>
+              <a:latin typeface="Arial" panose="020B0604020202020204" pitchFamily="34" charset="0"/>
+              <a:cs typeface="Arial" panose="020B0604020202020204" pitchFamily="34" charset="0"/>
+            </a:endParaRPr>
           </a:p>
         </p:txBody>
       </p:sp>
@@ -12178,7 +12195,7 @@
         <p:spPr bwMode="auto">
           <a:xfrm>
             <a:off x="3877454" y="3471809"/>
-            <a:ext cx="4412150" cy="919401"/>
+            <a:ext cx="3794682" cy="919401"/>
           </a:xfrm>
           <a:prstGeom prst="wedgeRoundRectCallout">
             <a:avLst>
@@ -12200,7 +12217,7 @@
           <a:effectLst/>
         </p:spPr>
         <p:txBody>
-          <a:bodyPr rot="0" spcFirstLastPara="0" vertOverflow="overflow" horzOverflow="overflow" vert="horz" wrap="none" lIns="91440" tIns="45720" rIns="91440" bIns="45720" numCol="1" spcCol="0" rtlCol="0" fromWordArt="0" anchor="ctr" anchorCtr="1" forceAA="0" compatLnSpc="1">
+          <a:bodyPr rot="0" spcFirstLastPara="0" vertOverflow="overflow" horzOverflow="overflow" vert="horz" wrap="square" lIns="91440" tIns="45720" rIns="91440" bIns="45720" numCol="1" spcCol="0" rtlCol="0" fromWordArt="0" anchor="ctr" anchorCtr="1" forceAA="0" compatLnSpc="1">
             <a:prstTxWarp prst="textNoShape">
               <a:avLst/>
             </a:prstTxWarp>
@@ -12236,9 +12253,49 @@
                 <a:latin typeface="Arial" panose="020B0604020202020204" pitchFamily="34" charset="0"/>
                 <a:cs typeface="Arial" panose="020B0604020202020204" pitchFamily="34" charset="0"/>
               </a:rPr>
-              <a:t>Passive Agent:</a:t>
+              <a:t>Passive only: code called by other accounts</a:t>
             </a:r>
           </a:p>
+        </p:txBody>
+      </p:sp>
+      <p:sp>
+        <p:nvSpPr>
+          <p:cNvPr id="9" name="Rounded Rectangular Callout 8"/>
+          <p:cNvSpPr/>
+          <p:nvPr/>
+        </p:nvSpPr>
+        <p:spPr bwMode="auto">
+          <a:xfrm>
+            <a:off x="3496454" y="5326103"/>
+            <a:ext cx="4621313" cy="919401"/>
+          </a:xfrm>
+          <a:prstGeom prst="wedgeRoundRectCallout">
+            <a:avLst>
+              <a:gd name="adj1" fmla="val -73037"/>
+              <a:gd name="adj2" fmla="val -235331"/>
+              <a:gd name="adj3" fmla="val 16667"/>
+            </a:avLst>
+          </a:prstGeom>
+          <a:noFill/>
+          <a:ln w="76200" cap="flat" cmpd="sng" algn="ctr">
+            <a:solidFill>
+              <a:schemeClr val="tx1"/>
+            </a:solidFill>
+            <a:prstDash val="solid"/>
+            <a:round/>
+            <a:headEnd type="none" w="med" len="med"/>
+            <a:tailEnd type="none" w="med" len="med"/>
+          </a:ln>
+          <a:effectLst/>
+        </p:spPr>
+        <p:txBody>
+          <a:bodyPr rot="0" spcFirstLastPara="0" vertOverflow="overflow" horzOverflow="overflow" vert="horz" wrap="square" lIns="91440" tIns="45720" rIns="91440" bIns="45720" numCol="1" spcCol="0" rtlCol="0" fromWordArt="0" anchor="ctr" anchorCtr="1" forceAA="0" compatLnSpc="1">
+            <a:prstTxWarp prst="textNoShape">
+              <a:avLst/>
+            </a:prstTxWarp>
+            <a:spAutoFit/>
+          </a:bodyPr>
+          <a:lstStyle/>
           <a:p>
             <a:pPr marL="0" marR="0" indent="0" algn="l" defTabSz="914400" rtl="0" eaLnBrk="0" fontAlgn="base" latinLnBrk="0" hangingPunct="0">
               <a:lnSpc>
@@ -12268,79 +12325,7 @@
                 <a:latin typeface="Arial" panose="020B0604020202020204" pitchFamily="34" charset="0"/>
                 <a:cs typeface="Arial" panose="020B0604020202020204" pitchFamily="34" charset="0"/>
               </a:rPr>
-              <a:t>code called by other accounts</a:t>
-            </a:r>
-          </a:p>
-        </p:txBody>
-      </p:sp>
-      <p:sp>
-        <p:nvSpPr>
-          <p:cNvPr id="9" name="Rounded Rectangular Callout 8"/>
-          <p:cNvSpPr/>
-          <p:nvPr/>
-        </p:nvSpPr>
-        <p:spPr bwMode="auto">
-          <a:xfrm>
-            <a:off x="3496454" y="5326103"/>
-            <a:ext cx="3794683" cy="919401"/>
-          </a:xfrm>
-          <a:prstGeom prst="wedgeRoundRectCallout">
-            <a:avLst>
-              <a:gd name="adj1" fmla="val -75742"/>
-              <a:gd name="adj2" fmla="val -224598"/>
-              <a:gd name="adj3" fmla="val 16667"/>
-            </a:avLst>
-          </a:prstGeom>
-          <a:noFill/>
-          <a:ln w="76200" cap="flat" cmpd="sng" algn="ctr">
-            <a:solidFill>
-              <a:schemeClr val="tx1"/>
-            </a:solidFill>
-            <a:prstDash val="solid"/>
-            <a:round/>
-            <a:headEnd type="none" w="med" len="med"/>
-            <a:tailEnd type="none" w="med" len="med"/>
-          </a:ln>
-          <a:effectLst/>
-        </p:spPr>
-        <p:txBody>
-          <a:bodyPr rot="0" spcFirstLastPara="0" vertOverflow="overflow" horzOverflow="overflow" vert="horz" wrap="square" lIns="91440" tIns="45720" rIns="91440" bIns="45720" numCol="1" spcCol="0" rtlCol="0" fromWordArt="0" anchor="ctr" anchorCtr="1" forceAA="0" compatLnSpc="1">
-            <a:prstTxWarp prst="textNoShape">
-              <a:avLst/>
-            </a:prstTxWarp>
-            <a:spAutoFit/>
-          </a:bodyPr>
-          <a:lstStyle/>
-          <a:p>
-            <a:pPr marL="0" marR="0" indent="0" algn="l" defTabSz="914400" rtl="0" eaLnBrk="0" fontAlgn="base" latinLnBrk="0" hangingPunct="0">
-              <a:lnSpc>
-                <a:spcPct val="100000"/>
-              </a:lnSpc>
-              <a:spcBef>
-                <a:spcPct val="0"/>
-              </a:spcBef>
-              <a:spcAft>
-                <a:spcPct val="0"/>
-              </a:spcAft>
-              <a:buClrTx/>
-              <a:buSzTx/>
-              <a:buFontTx/>
-              <a:buNone/>
-              <a:tabLst/>
-            </a:pPr>
-            <a:r>
-              <a:rPr kumimoji="0" lang="en-US" sz="2400" b="0" i="0" u="none" strike="noStrike" cap="none" normalizeH="0" baseline="0" dirty="0">
-                <a:ln>
-                  <a:noFill/>
-                </a:ln>
-                <a:solidFill>
-                  <a:srgbClr val="FFFF00"/>
-                </a:solidFill>
-                <a:effectLst/>
-                <a:latin typeface="Arial" panose="020B0604020202020204" pitchFamily="34" charset="0"/>
-                <a:cs typeface="Arial" panose="020B0604020202020204" pitchFamily="34" charset="0"/>
-              </a:rPr>
-              <a:t>code can transfer money,</a:t>
+              <a:t>code can transfer currency,</a:t>
             </a:r>
             <a:r>
               <a:rPr kumimoji="0" lang="en-US" sz="2400" b="0" i="0" u="none" strike="noStrike" cap="none" normalizeH="0" dirty="0">
@@ -16403,7 +16388,7 @@
             <a:r>
               <a:rPr lang="en-US" sz="2800" i="1" dirty="0">
                 <a:solidFill>
-                  <a:srgbClr val="FFC000"/>
+                  <a:schemeClr val="tx1"/>
                 </a:solidFill>
                 <a:latin typeface="Arial" panose="020B0604020202020204" pitchFamily="34" charset="0"/>
                 <a:cs typeface="Arial" panose="020B0604020202020204" pitchFamily="34" charset="0"/>
@@ -16413,7 +16398,7 @@
             </a:r>
             <a:endParaRPr lang="en-US" sz="1050" i="1" dirty="0">
               <a:solidFill>
-                <a:srgbClr val="FFC000"/>
+                <a:schemeClr val="tx1"/>
               </a:solidFill>
               <a:latin typeface="Arial" panose="020B0604020202020204" pitchFamily="34" charset="0"/>
               <a:cs typeface="Arial" panose="020B0604020202020204" pitchFamily="34" charset="0"/>
@@ -17380,7 +17365,7 @@
         </p:nvSpPr>
         <p:spPr bwMode="auto">
           <a:xfrm>
-            <a:off x="1000464" y="2452837"/>
+            <a:off x="1000463" y="2452837"/>
             <a:ext cx="4951715" cy="523220"/>
           </a:xfrm>
           <a:prstGeom prst="rect">
@@ -17442,8 +17427,8 @@
         </p:nvSpPr>
         <p:spPr bwMode="auto">
           <a:xfrm>
-            <a:off x="1000464" y="3608070"/>
-            <a:ext cx="5666073" cy="523220"/>
+            <a:off x="1000463" y="3614024"/>
+            <a:ext cx="4696445" cy="523220"/>
           </a:xfrm>
           <a:prstGeom prst="rect">
             <a:avLst/>
@@ -17483,7 +17468,7 @@
                 <a:cs typeface="Arial" panose="020B0604020202020204" pitchFamily="34" charset="0"/>
                 <a:sym typeface="Mathematica1" pitchFamily="2" charset="2"/>
               </a:rPr>
-              <a:t>But gas price in Ether up to caller!</a:t>
+              <a:t>Gas price in Ether can vary</a:t>
             </a:r>
             <a:endParaRPr lang="en-US" sz="1050" dirty="0">
               <a:solidFill>
@@ -17505,7 +17490,7 @@
         <p:spPr bwMode="auto">
           <a:xfrm>
             <a:off x="1000463" y="4775210"/>
-            <a:ext cx="5186977" cy="523220"/>
+            <a:ext cx="6275266" cy="523220"/>
           </a:xfrm>
           <a:prstGeom prst="rect">
             <a:avLst/>
@@ -17545,69 +17530,7 @@
                 <a:cs typeface="Arial" panose="020B0604020202020204" pitchFamily="34" charset="0"/>
                 <a:sym typeface="Mathematica1" pitchFamily="2" charset="2"/>
               </a:rPr>
-              <a:t>Low price means low priority …</a:t>
-            </a:r>
-            <a:endParaRPr lang="en-US" sz="1050" dirty="0">
-              <a:solidFill>
-                <a:srgbClr val="FFFF00"/>
-              </a:solidFill>
-              <a:latin typeface="Arial" panose="020B0604020202020204" pitchFamily="34" charset="0"/>
-              <a:cs typeface="Arial" panose="020B0604020202020204" pitchFamily="34" charset="0"/>
-              <a:sym typeface="Mathematica1" pitchFamily="2" charset="2"/>
-            </a:endParaRPr>
-          </a:p>
-        </p:txBody>
-      </p:sp>
-      <p:sp>
-        <p:nvSpPr>
-          <p:cNvPr id="10" name="TextBox 9"/>
-          <p:cNvSpPr txBox="1"/>
-          <p:nvPr/>
-        </p:nvSpPr>
-        <p:spPr bwMode="auto">
-          <a:xfrm>
-            <a:off x="3552203" y="5551678"/>
-            <a:ext cx="2635237" cy="523220"/>
-          </a:xfrm>
-          <a:prstGeom prst="rect">
-            <a:avLst/>
-          </a:prstGeom>
-          <a:solidFill>
-            <a:schemeClr val="bg1"/>
-          </a:solidFill>
-          <a:ln w="76200">
-            <a:solidFill>
-              <a:srgbClr val="FFC000"/>
-            </a:solidFill>
-            <a:miter lim="800000"/>
-            <a:headEnd/>
-            <a:tailEnd/>
-          </a:ln>
-          <a:effectLst>
-            <a:outerShdw blurRad="50800" dist="38100" dir="2700000" algn="tl" rotWithShape="0">
-              <a:prstClr val="black">
-                <a:alpha val="40000"/>
-              </a:prstClr>
-            </a:outerShdw>
-          </a:effectLst>
-        </p:spPr>
-        <p:txBody>
-          <a:bodyPr wrap="square" rtlCol="0">
-            <a:spAutoFit/>
-          </a:bodyPr>
-          <a:lstStyle/>
-          <a:p>
-            <a:pPr algn="l"/>
-            <a:r>
-              <a:rPr lang="en-US" sz="2800" dirty="0">
-                <a:solidFill>
-                  <a:srgbClr val="FFFF00"/>
-                </a:solidFill>
-                <a:latin typeface="Arial" panose="020B0604020202020204" pitchFamily="34" charset="0"/>
-                <a:cs typeface="Arial" panose="020B0604020202020204" pitchFamily="34" charset="0"/>
-                <a:sym typeface="Mathematica1" pitchFamily="2" charset="2"/>
-              </a:rPr>
-              <a:t>And vice-versa</a:t>
+              <a:t>Priority determined by additional fees</a:t>
             </a:r>
             <a:endParaRPr lang="en-US" sz="1050" dirty="0">
               <a:solidFill>
@@ -17773,51 +17696,6 @@
                       </p:childTnLst>
                     </p:cTn>
                   </p:par>
-                  <p:par>
-                    <p:cTn id="15" fill="hold">
-                      <p:stCondLst>
-                        <p:cond delay="indefinite"/>
-                      </p:stCondLst>
-                      <p:childTnLst>
-                        <p:par>
-                          <p:cTn id="16" fill="hold">
-                            <p:stCondLst>
-                              <p:cond delay="0"/>
-                            </p:stCondLst>
-                            <p:childTnLst>
-                              <p:par>
-                                <p:cTn id="17" presetID="1" presetClass="entr" presetSubtype="0" fill="hold" grpId="0" nodeType="clickEffect">
-                                  <p:stCondLst>
-                                    <p:cond delay="0"/>
-                                  </p:stCondLst>
-                                  <p:childTnLst>
-                                    <p:set>
-                                      <p:cBhvr>
-                                        <p:cTn id="18" dur="1" fill="hold">
-                                          <p:stCondLst>
-                                            <p:cond delay="0"/>
-                                          </p:stCondLst>
-                                        </p:cTn>
-                                        <p:tgtEl>
-                                          <p:spTgt spid="10"/>
-                                        </p:tgtEl>
-                                        <p:attrNameLst>
-                                          <p:attrName>style.visibility</p:attrName>
-                                        </p:attrNameLst>
-                                      </p:cBhvr>
-                                      <p:to>
-                                        <p:strVal val="visible"/>
-                                      </p:to>
-                                    </p:set>
-                                  </p:childTnLst>
-                                </p:cTn>
-                              </p:par>
-                            </p:childTnLst>
-                          </p:cTn>
-                        </p:par>
-                      </p:childTnLst>
-                    </p:cTn>
-                  </p:par>
                 </p:childTnLst>
               </p:cTn>
               <p:prevCondLst>
@@ -17843,7 +17721,6 @@
       <p:bldP spid="5" grpId="0" animBg="1"/>
       <p:bldP spid="6" grpId="0" animBg="1"/>
       <p:bldP spid="9" grpId="0" animBg="1"/>
-      <p:bldP spid="10" grpId="0" animBg="1"/>
     </p:bldLst>
   </p:timing>
 </p:sld>
@@ -18736,7 +18613,7 @@
             <a:r>
               <a:rPr lang="en-US" sz="2800" i="1" dirty="0">
                 <a:solidFill>
-                  <a:srgbClr val="FFC000"/>
+                  <a:schemeClr val="tx1"/>
                 </a:solidFill>
                 <a:latin typeface="Arial" panose="020B0604020202020204" pitchFamily="34" charset="0"/>
                 <a:cs typeface="Arial" panose="020B0604020202020204" pitchFamily="34" charset="0"/>
@@ -18983,7 +18860,7 @@
             <a:r>
               <a:rPr lang="en-US" sz="2800" i="1" dirty="0">
                 <a:solidFill>
-                  <a:srgbClr val="FFC000"/>
+                  <a:schemeClr val="tx1"/>
                 </a:solidFill>
                 <a:latin typeface="Arial" panose="020B0604020202020204" pitchFamily="34" charset="0"/>
                 <a:cs typeface="Arial" panose="020B0604020202020204" pitchFamily="34" charset="0"/>
@@ -21566,8 +21443,8 @@
         </p:nvSpPr>
         <p:spPr bwMode="auto">
           <a:xfrm>
-            <a:off x="3724047" y="3858400"/>
-            <a:ext cx="3887975" cy="510778"/>
+            <a:off x="3850769" y="3942931"/>
+            <a:ext cx="4371908" cy="510778"/>
           </a:xfrm>
           <a:prstGeom prst="wedgeRoundRectCallout">
             <a:avLst>
@@ -21627,7 +21504,7 @@
                 <a:latin typeface="Arial" panose="020B0604020202020204" pitchFamily="34" charset="0"/>
                 <a:cs typeface="Arial" panose="020B0604020202020204" pitchFamily="34" charset="0"/>
               </a:rPr>
-              <a:t>Call canceled  if exceeded</a:t>
+              <a:t>Call canceled if limit exceeded</a:t>
             </a:r>
             <a:endParaRPr kumimoji="0" lang="en-US" sz="2400" b="0" i="0" u="none" strike="noStrike" cap="none" normalizeH="0" baseline="0" dirty="0">
               <a:ln>
@@ -25854,9 +25731,32 @@
                 <a:prstGeom prst="rect">
                   <a:avLst/>
                 </a:prstGeom>
-                <a:solidFill>
-                  <a:srgbClr val="FFFF00"/>
-                </a:solidFill>
+                <a:gradFill flip="none" rotWithShape="1">
+                  <a:gsLst>
+                    <a:gs pos="0">
+                      <a:srgbClr val="FFFF00">
+                        <a:tint val="66000"/>
+                        <a:satMod val="160000"/>
+                      </a:srgbClr>
+                    </a:gs>
+                    <a:gs pos="50000">
+                      <a:srgbClr val="FFFF00">
+                        <a:tint val="44500"/>
+                        <a:satMod val="160000"/>
+                      </a:srgbClr>
+                    </a:gs>
+                    <a:gs pos="100000">
+                      <a:srgbClr val="FFFF00">
+                        <a:tint val="23500"/>
+                        <a:satMod val="160000"/>
+                      </a:srgbClr>
+                    </a:gs>
+                  </a:gsLst>
+                  <a:path path="circle">
+                    <a:fillToRect l="50000" t="50000" r="50000" b="50000"/>
+                  </a:path>
+                  <a:tileRect/>
+                </a:gradFill>
                 <a:ln w="76200" cap="flat" cmpd="sng" algn="ctr">
                   <a:solidFill>
                     <a:srgbClr val="FF0000"/>
@@ -25924,9 +25824,32 @@
                 <a:prstGeom prst="rect">
                   <a:avLst/>
                 </a:prstGeom>
-                <a:solidFill>
-                  <a:srgbClr val="FFFF00"/>
-                </a:solidFill>
+                <a:gradFill flip="none" rotWithShape="1">
+                  <a:gsLst>
+                    <a:gs pos="0">
+                      <a:srgbClr val="FFFF00">
+                        <a:tint val="66000"/>
+                        <a:satMod val="160000"/>
+                      </a:srgbClr>
+                    </a:gs>
+                    <a:gs pos="50000">
+                      <a:srgbClr val="FFFF00">
+                        <a:tint val="44500"/>
+                        <a:satMod val="160000"/>
+                      </a:srgbClr>
+                    </a:gs>
+                    <a:gs pos="100000">
+                      <a:srgbClr val="FFFF00">
+                        <a:tint val="23500"/>
+                        <a:satMod val="160000"/>
+                      </a:srgbClr>
+                    </a:gs>
+                  </a:gsLst>
+                  <a:path path="circle">
+                    <a:fillToRect l="50000" t="50000" r="50000" b="50000"/>
+                  </a:path>
+                  <a:tileRect/>
+                </a:gradFill>
                 <a:ln w="76200" cap="flat" cmpd="sng" algn="ctr">
                   <a:solidFill>
                     <a:srgbClr val="FF0000"/>
@@ -26009,9 +25932,32 @@
                 <a:prstGeom prst="rect">
                   <a:avLst/>
                 </a:prstGeom>
-                <a:solidFill>
-                  <a:srgbClr val="FFFF00"/>
-                </a:solidFill>
+                <a:gradFill flip="none" rotWithShape="1">
+                  <a:gsLst>
+                    <a:gs pos="0">
+                      <a:srgbClr val="FFFF00">
+                        <a:tint val="66000"/>
+                        <a:satMod val="160000"/>
+                      </a:srgbClr>
+                    </a:gs>
+                    <a:gs pos="50000">
+                      <a:srgbClr val="FFFF00">
+                        <a:tint val="44500"/>
+                        <a:satMod val="160000"/>
+                      </a:srgbClr>
+                    </a:gs>
+                    <a:gs pos="100000">
+                      <a:srgbClr val="FFFF00">
+                        <a:tint val="23500"/>
+                        <a:satMod val="160000"/>
+                      </a:srgbClr>
+                    </a:gs>
+                  </a:gsLst>
+                  <a:path path="circle">
+                    <a:fillToRect l="50000" t="50000" r="50000" b="50000"/>
+                  </a:path>
+                  <a:tileRect/>
+                </a:gradFill>
                 <a:ln w="76200" cap="flat" cmpd="sng" algn="ctr">
                   <a:solidFill>
                     <a:srgbClr val="FF0000"/>
@@ -26079,9 +26025,32 @@
                 <a:prstGeom prst="rect">
                   <a:avLst/>
                 </a:prstGeom>
-                <a:solidFill>
-                  <a:srgbClr val="FFFF00"/>
-                </a:solidFill>
+                <a:gradFill flip="none" rotWithShape="1">
+                  <a:gsLst>
+                    <a:gs pos="0">
+                      <a:srgbClr val="FFFF00">
+                        <a:tint val="66000"/>
+                        <a:satMod val="160000"/>
+                      </a:srgbClr>
+                    </a:gs>
+                    <a:gs pos="50000">
+                      <a:srgbClr val="FFFF00">
+                        <a:tint val="44500"/>
+                        <a:satMod val="160000"/>
+                      </a:srgbClr>
+                    </a:gs>
+                    <a:gs pos="100000">
+                      <a:srgbClr val="FFFF00">
+                        <a:tint val="23500"/>
+                        <a:satMod val="160000"/>
+                      </a:srgbClr>
+                    </a:gs>
+                  </a:gsLst>
+                  <a:path path="circle">
+                    <a:fillToRect l="50000" t="50000" r="50000" b="50000"/>
+                  </a:path>
+                  <a:tileRect/>
+                </a:gradFill>
                 <a:ln w="76200" cap="flat" cmpd="sng" algn="ctr">
                   <a:solidFill>
                     <a:srgbClr val="FF0000"/>
@@ -26282,9 +26251,32 @@
             <a:prstGeom prst="can">
               <a:avLst/>
             </a:prstGeom>
-            <a:solidFill>
-              <a:srgbClr val="FFFF00"/>
-            </a:solidFill>
+            <a:gradFill flip="none" rotWithShape="1">
+              <a:gsLst>
+                <a:gs pos="0">
+                  <a:srgbClr val="FFFF00">
+                    <a:tint val="66000"/>
+                    <a:satMod val="160000"/>
+                  </a:srgbClr>
+                </a:gs>
+                <a:gs pos="50000">
+                  <a:srgbClr val="FFFF00">
+                    <a:tint val="44500"/>
+                    <a:satMod val="160000"/>
+                  </a:srgbClr>
+                </a:gs>
+                <a:gs pos="100000">
+                  <a:srgbClr val="FFFF00">
+                    <a:tint val="23500"/>
+                    <a:satMod val="160000"/>
+                  </a:srgbClr>
+                </a:gs>
+              </a:gsLst>
+              <a:path path="circle">
+                <a:fillToRect l="50000" t="50000" r="50000" b="50000"/>
+              </a:path>
+              <a:tileRect/>
+            </a:gradFill>
             <a:ln w="76200" cap="flat" cmpd="sng" algn="ctr">
               <a:solidFill>
                 <a:srgbClr val="FF0000"/>
@@ -26418,9 +26410,32 @@
             <a:prstGeom prst="foldedCorner">
               <a:avLst/>
             </a:prstGeom>
-            <a:solidFill>
-              <a:srgbClr val="FFFF00"/>
-            </a:solidFill>
+            <a:gradFill flip="none" rotWithShape="1">
+              <a:gsLst>
+                <a:gs pos="0">
+                  <a:srgbClr val="FFFF00">
+                    <a:tint val="66000"/>
+                    <a:satMod val="160000"/>
+                  </a:srgbClr>
+                </a:gs>
+                <a:gs pos="50000">
+                  <a:srgbClr val="FFFF00">
+                    <a:tint val="44500"/>
+                    <a:satMod val="160000"/>
+                  </a:srgbClr>
+                </a:gs>
+                <a:gs pos="100000">
+                  <a:srgbClr val="FFFF00">
+                    <a:tint val="23500"/>
+                    <a:satMod val="160000"/>
+                  </a:srgbClr>
+                </a:gs>
+              </a:gsLst>
+              <a:path path="circle">
+                <a:fillToRect l="50000" t="50000" r="50000" b="50000"/>
+              </a:path>
+              <a:tileRect/>
+            </a:gradFill>
             <a:ln w="76200" cap="flat" cmpd="sng" algn="ctr">
               <a:solidFill>
                 <a:srgbClr val="FF0000"/>
@@ -29565,8 +29580,8 @@
         </p:nvSpPr>
         <p:spPr bwMode="auto">
           <a:xfrm>
-            <a:off x="2121869" y="5550069"/>
-            <a:ext cx="6207148" cy="510778"/>
+            <a:off x="2790466" y="5550069"/>
+            <a:ext cx="4869955" cy="510778"/>
           </a:xfrm>
           <a:prstGeom prst="wedgeRoundRectCallout">
             <a:avLst>
@@ -29626,7 +29641,7 @@
                 <a:latin typeface="Arial" panose="020B0604020202020204" pitchFamily="34" charset="0"/>
                 <a:cs typeface="Arial" panose="020B0604020202020204" pitchFamily="34" charset="0"/>
               </a:rPr>
-              <a:t>Gas costs too expensive to</a:t>
+              <a:t>Too expensive to</a:t>
             </a:r>
             <a:r>
               <a:rPr kumimoji="0" lang="en-US" sz="2400" b="0" i="0" u="none" strike="noStrike" cap="none" normalizeH="0" dirty="0">
@@ -33667,253 +33682,171 @@
           </a:p>
         </p:txBody>
       </p:sp>
-      <p:grpSp>
-        <p:nvGrpSpPr>
-          <p:cNvPr id="14" name="Group 13"/>
-          <p:cNvGrpSpPr/>
+      <p:cxnSp>
+        <p:nvCxnSpPr>
+          <p:cNvPr id="6" name="Straight Connector 5"/>
+          <p:cNvCxnSpPr/>
           <p:nvPr/>
-        </p:nvGrpSpPr>
-        <p:grpSpPr>
+        </p:nvCxnSpPr>
+        <p:spPr bwMode="auto">
           <a:xfrm>
-            <a:off x="3600063" y="1811030"/>
-            <a:ext cx="3322319" cy="3657600"/>
-            <a:chOff x="3200400" y="2331720"/>
-            <a:chExt cx="3322319" cy="3657600"/>
+            <a:off x="3600063" y="2329190"/>
+            <a:ext cx="3291840" cy="0"/>
           </a:xfrm>
-        </p:grpSpPr>
-        <p:sp>
-          <p:nvSpPr>
-            <p:cNvPr id="4" name="Rectangle 3"/>
-            <p:cNvSpPr/>
-            <p:nvPr/>
-          </p:nvSpPr>
-          <p:spPr bwMode="auto">
-            <a:xfrm>
-              <a:off x="3200400" y="2331720"/>
-              <a:ext cx="3291840" cy="3657600"/>
-            </a:xfrm>
-            <a:prstGeom prst="rect">
-              <a:avLst/>
-            </a:prstGeom>
+          <a:prstGeom prst="line">
+            <a:avLst/>
+          </a:prstGeom>
+          <a:solidFill>
+            <a:srgbClr val="FFFFCC"/>
+          </a:solidFill>
+          <a:ln w="76200" cap="flat" cmpd="sng" algn="ctr">
             <a:solidFill>
-              <a:srgbClr val="FFFF00"/>
+              <a:srgbClr val="FF0000"/>
             </a:solidFill>
-            <a:ln w="76200" cap="flat" cmpd="sng" algn="ctr">
-              <a:solidFill>
-                <a:srgbClr val="FF0000"/>
-              </a:solidFill>
-              <a:prstDash val="solid"/>
-              <a:round/>
-              <a:headEnd type="none" w="med" len="med"/>
-              <a:tailEnd type="none" w="med" len="med"/>
-            </a:ln>
-            <a:effectLst/>
-          </p:spPr>
-          <p:txBody>
-            <a:bodyPr rot="0" spcFirstLastPara="0" vertOverflow="overflow" horzOverflow="overflow" vert="horz" wrap="none" lIns="91440" tIns="45720" rIns="91440" bIns="45720" numCol="1" spcCol="0" rtlCol="0" fromWordArt="0" anchor="ctr" anchorCtr="1" forceAA="0" compatLnSpc="1">
-              <a:prstTxWarp prst="textNoShape">
-                <a:avLst/>
-              </a:prstTxWarp>
-              <a:spAutoFit/>
-            </a:bodyPr>
-            <a:lstStyle/>
-            <a:p>
-              <a:pPr marL="0" marR="0" indent="0" algn="r" defTabSz="914400" rtl="0" eaLnBrk="0" fontAlgn="base" latinLnBrk="0" hangingPunct="0">
-                <a:lnSpc>
-                  <a:spcPct val="100000"/>
-                </a:lnSpc>
-                <a:spcBef>
-                  <a:spcPct val="0"/>
-                </a:spcBef>
-                <a:spcAft>
-                  <a:spcPct val="0"/>
-                </a:spcAft>
-                <a:buClrTx/>
-                <a:buSzTx/>
-                <a:buFontTx/>
-                <a:buNone/>
-                <a:tabLst/>
-              </a:pPr>
-              <a:endParaRPr kumimoji="0" lang="en-US" sz="2400" b="0" i="0" u="none" strike="noStrike" cap="none" normalizeH="0" baseline="0" dirty="0">
-                <a:ln>
-                  <a:noFill/>
-                </a:ln>
+            <a:prstDash val="solid"/>
+            <a:round/>
+            <a:headEnd type="none" w="med" len="med"/>
+            <a:tailEnd type="none" w="med" len="med"/>
+          </a:ln>
+          <a:effectLst/>
+        </p:spPr>
+      </p:cxnSp>
+      <p:cxnSp>
+        <p:nvCxnSpPr>
+          <p:cNvPr id="7" name="Straight Connector 6"/>
+          <p:cNvCxnSpPr/>
+          <p:nvPr/>
+        </p:nvCxnSpPr>
+        <p:spPr bwMode="auto">
+          <a:xfrm>
+            <a:off x="3600063" y="2773690"/>
+            <a:ext cx="3291840" cy="0"/>
+          </a:xfrm>
+          <a:prstGeom prst="line">
+            <a:avLst/>
+          </a:prstGeom>
+          <a:solidFill>
+            <a:srgbClr val="FFFFCC"/>
+          </a:solidFill>
+          <a:ln w="76200" cap="flat" cmpd="sng" algn="ctr">
+            <a:solidFill>
+              <a:srgbClr val="FF0000"/>
+            </a:solidFill>
+            <a:prstDash val="solid"/>
+            <a:round/>
+            <a:headEnd type="none" w="med" len="med"/>
+            <a:tailEnd type="none" w="med" len="med"/>
+          </a:ln>
+          <a:effectLst/>
+        </p:spPr>
+      </p:cxnSp>
+      <p:cxnSp>
+        <p:nvCxnSpPr>
+          <p:cNvPr id="8" name="Straight Connector 7"/>
+          <p:cNvCxnSpPr/>
+          <p:nvPr/>
+        </p:nvCxnSpPr>
+        <p:spPr bwMode="auto">
+          <a:xfrm>
+            <a:off x="3600063" y="3218190"/>
+            <a:ext cx="3291840" cy="0"/>
+          </a:xfrm>
+          <a:prstGeom prst="line">
+            <a:avLst/>
+          </a:prstGeom>
+          <a:solidFill>
+            <a:srgbClr val="FFFFCC"/>
+          </a:solidFill>
+          <a:ln w="76200" cap="flat" cmpd="sng" algn="ctr">
+            <a:solidFill>
+              <a:srgbClr val="FF0000"/>
+            </a:solidFill>
+            <a:prstDash val="solid"/>
+            <a:round/>
+            <a:headEnd type="none" w="med" len="med"/>
+            <a:tailEnd type="none" w="med" len="med"/>
+          </a:ln>
+          <a:effectLst/>
+        </p:spPr>
+      </p:cxnSp>
+      <p:cxnSp>
+        <p:nvCxnSpPr>
+          <p:cNvPr id="9" name="Straight Connector 8"/>
+          <p:cNvCxnSpPr/>
+          <p:nvPr/>
+        </p:nvCxnSpPr>
+        <p:spPr bwMode="auto">
+          <a:xfrm>
+            <a:off x="3630542" y="4996190"/>
+            <a:ext cx="3291840" cy="0"/>
+          </a:xfrm>
+          <a:prstGeom prst="line">
+            <a:avLst/>
+          </a:prstGeom>
+          <a:solidFill>
+            <a:srgbClr val="FFFFCC"/>
+          </a:solidFill>
+          <a:ln w="76200" cap="flat" cmpd="sng" algn="ctr">
+            <a:solidFill>
+              <a:srgbClr val="FF0000"/>
+            </a:solidFill>
+            <a:prstDash val="solid"/>
+            <a:round/>
+            <a:headEnd type="none" w="med" len="med"/>
+            <a:tailEnd type="none" w="med" len="med"/>
+          </a:ln>
+          <a:effectLst/>
+        </p:spPr>
+      </p:cxnSp>
+      <p:sp>
+        <p:nvSpPr>
+          <p:cNvPr id="10" name="TextBox 9"/>
+          <p:cNvSpPr txBox="1"/>
+          <p:nvPr/>
+        </p:nvSpPr>
+        <p:spPr bwMode="auto">
+          <a:xfrm rot="5400000">
+            <a:off x="5095289" y="3680421"/>
+            <a:ext cx="697627" cy="707886"/>
+          </a:xfrm>
+          <a:prstGeom prst="rect">
+            <a:avLst/>
+          </a:prstGeom>
+          <a:noFill/>
+          <a:ln w="76200">
+            <a:noFill/>
+            <a:miter lim="800000"/>
+            <a:headEnd/>
+            <a:tailEnd/>
+          </a:ln>
+          <a:effectLst>
+            <a:outerShdw blurRad="50800" dist="38100" dir="2700000" algn="tl" rotWithShape="0">
+              <a:prstClr val="black">
+                <a:alpha val="40000"/>
+              </a:prstClr>
+            </a:outerShdw>
+          </a:effectLst>
+        </p:spPr>
+        <p:txBody>
+          <a:bodyPr wrap="none" rtlCol="0">
+            <a:spAutoFit/>
+          </a:bodyPr>
+          <a:lstStyle/>
+          <a:p>
+            <a:pPr algn="l"/>
+            <a:r>
+              <a:rPr lang="en-US" sz="4000" dirty="0">
                 <a:solidFill>
-                  <a:srgbClr val="FF0066"/>
+                  <a:srgbClr val="FF0000"/>
                 </a:solidFill>
-                <a:effectLst/>
                 <a:latin typeface="Arial" panose="020B0604020202020204" pitchFamily="34" charset="0"/>
                 <a:cs typeface="Arial" panose="020B0604020202020204" pitchFamily="34" charset="0"/>
-              </a:endParaRPr>
-            </a:p>
-          </p:txBody>
-        </p:sp>
-        <p:cxnSp>
-          <p:nvCxnSpPr>
-            <p:cNvPr id="6" name="Straight Connector 5"/>
-            <p:cNvCxnSpPr/>
-            <p:nvPr/>
-          </p:nvCxnSpPr>
-          <p:spPr bwMode="auto">
-            <a:xfrm>
-              <a:off x="3200400" y="2849880"/>
-              <a:ext cx="3291840" cy="0"/>
-            </a:xfrm>
-            <a:prstGeom prst="line">
-              <a:avLst/>
-            </a:prstGeom>
-            <a:solidFill>
-              <a:srgbClr val="FFFFCC"/>
-            </a:solidFill>
-            <a:ln w="76200" cap="flat" cmpd="sng" algn="ctr">
-              <a:solidFill>
-                <a:srgbClr val="FF0000"/>
-              </a:solidFill>
-              <a:prstDash val="solid"/>
-              <a:round/>
-              <a:headEnd type="none" w="med" len="med"/>
-              <a:tailEnd type="none" w="med" len="med"/>
-            </a:ln>
-            <a:effectLst/>
-          </p:spPr>
-        </p:cxnSp>
-        <p:cxnSp>
-          <p:nvCxnSpPr>
-            <p:cNvPr id="7" name="Straight Connector 6"/>
-            <p:cNvCxnSpPr/>
-            <p:nvPr/>
-          </p:nvCxnSpPr>
-          <p:spPr bwMode="auto">
-            <a:xfrm>
-              <a:off x="3200400" y="3294380"/>
-              <a:ext cx="3291840" cy="0"/>
-            </a:xfrm>
-            <a:prstGeom prst="line">
-              <a:avLst/>
-            </a:prstGeom>
-            <a:solidFill>
-              <a:srgbClr val="FFFFCC"/>
-            </a:solidFill>
-            <a:ln w="76200" cap="flat" cmpd="sng" algn="ctr">
-              <a:solidFill>
-                <a:srgbClr val="FF0000"/>
-              </a:solidFill>
-              <a:prstDash val="solid"/>
-              <a:round/>
-              <a:headEnd type="none" w="med" len="med"/>
-              <a:tailEnd type="none" w="med" len="med"/>
-            </a:ln>
-            <a:effectLst/>
-          </p:spPr>
-        </p:cxnSp>
-        <p:cxnSp>
-          <p:nvCxnSpPr>
-            <p:cNvPr id="8" name="Straight Connector 7"/>
-            <p:cNvCxnSpPr/>
-            <p:nvPr/>
-          </p:nvCxnSpPr>
-          <p:spPr bwMode="auto">
-            <a:xfrm>
-              <a:off x="3200400" y="3738880"/>
-              <a:ext cx="3291840" cy="0"/>
-            </a:xfrm>
-            <a:prstGeom prst="line">
-              <a:avLst/>
-            </a:prstGeom>
-            <a:solidFill>
-              <a:srgbClr val="FFFFCC"/>
-            </a:solidFill>
-            <a:ln w="76200" cap="flat" cmpd="sng" algn="ctr">
-              <a:solidFill>
-                <a:srgbClr val="FF0000"/>
-              </a:solidFill>
-              <a:prstDash val="solid"/>
-              <a:round/>
-              <a:headEnd type="none" w="med" len="med"/>
-              <a:tailEnd type="none" w="med" len="med"/>
-            </a:ln>
-            <a:effectLst/>
-          </p:spPr>
-        </p:cxnSp>
-        <p:cxnSp>
-          <p:nvCxnSpPr>
-            <p:cNvPr id="9" name="Straight Connector 8"/>
-            <p:cNvCxnSpPr/>
-            <p:nvPr/>
-          </p:nvCxnSpPr>
-          <p:spPr bwMode="auto">
-            <a:xfrm>
-              <a:off x="3230879" y="5516880"/>
-              <a:ext cx="3291840" cy="0"/>
-            </a:xfrm>
-            <a:prstGeom prst="line">
-              <a:avLst/>
-            </a:prstGeom>
-            <a:solidFill>
-              <a:srgbClr val="FFFFCC"/>
-            </a:solidFill>
-            <a:ln w="76200" cap="flat" cmpd="sng" algn="ctr">
-              <a:solidFill>
-                <a:srgbClr val="FF0000"/>
-              </a:solidFill>
-              <a:prstDash val="solid"/>
-              <a:round/>
-              <a:headEnd type="none" w="med" len="med"/>
-              <a:tailEnd type="none" w="med" len="med"/>
-            </a:ln>
-            <a:effectLst/>
-          </p:spPr>
-        </p:cxnSp>
-        <p:sp>
-          <p:nvSpPr>
-            <p:cNvPr id="10" name="TextBox 9"/>
-            <p:cNvSpPr txBox="1"/>
-            <p:nvPr/>
-          </p:nvSpPr>
-          <p:spPr bwMode="auto">
-            <a:xfrm rot="5400000">
-              <a:off x="4695626" y="4201111"/>
-              <a:ext cx="697627" cy="707886"/>
-            </a:xfrm>
-            <a:prstGeom prst="rect">
-              <a:avLst/>
-            </a:prstGeom>
-            <a:noFill/>
-            <a:ln w="76200">
-              <a:noFill/>
-              <a:miter lim="800000"/>
-              <a:headEnd/>
-              <a:tailEnd/>
-            </a:ln>
-            <a:effectLst>
-              <a:outerShdw blurRad="50800" dist="38100" dir="2700000" algn="tl" rotWithShape="0">
-                <a:prstClr val="black">
-                  <a:alpha val="40000"/>
-                </a:prstClr>
-              </a:outerShdw>
-            </a:effectLst>
-          </p:spPr>
-          <p:txBody>
-            <a:bodyPr wrap="none" rtlCol="0">
-              <a:spAutoFit/>
-            </a:bodyPr>
-            <a:lstStyle/>
-            <a:p>
-              <a:pPr algn="l"/>
-              <a:r>
-                <a:rPr lang="en-US" sz="4000" dirty="0">
-                  <a:solidFill>
-                    <a:srgbClr val="FF0000"/>
-                  </a:solidFill>
-                  <a:latin typeface="Arial" panose="020B0604020202020204" pitchFamily="34" charset="0"/>
-                  <a:cs typeface="Arial" panose="020B0604020202020204" pitchFamily="34" charset="0"/>
-                </a:rPr>
-                <a:t>…</a:t>
-              </a:r>
-            </a:p>
-          </p:txBody>
-        </p:sp>
-      </p:grpSp>
+              </a:rPr>
+              <a:t>…</a:t>
+            </a:r>
+          </a:p>
+        </p:txBody>
+      </p:sp>
       <p:grpSp>
         <p:nvGrpSpPr>
           <p:cNvPr id="21" name="Group 20"/>
@@ -34268,6 +34201,294 @@
           </a:p>
         </p:txBody>
       </p:sp>
+      <p:sp>
+        <p:nvSpPr>
+          <p:cNvPr id="11" name="Rectangle 10">
+            <a:extLst>
+              <a:ext uri="{FF2B5EF4-FFF2-40B4-BE49-F238E27FC236}">
+                <a16:creationId xmlns:a16="http://schemas.microsoft.com/office/drawing/2014/main" id="{8ADAF71C-9F86-DBB1-0D24-E64A74D1787D}"/>
+              </a:ext>
+            </a:extLst>
+          </p:cNvPr>
+          <p:cNvSpPr/>
+          <p:nvPr/>
+        </p:nvSpPr>
+        <p:spPr bwMode="auto">
+          <a:xfrm>
+            <a:off x="3600063" y="1811030"/>
+            <a:ext cx="3291840" cy="3657600"/>
+          </a:xfrm>
+          <a:prstGeom prst="rect">
+            <a:avLst/>
+          </a:prstGeom>
+          <a:gradFill flip="none" rotWithShape="1">
+            <a:gsLst>
+              <a:gs pos="0">
+                <a:schemeClr val="accent5">
+                  <a:lumMod val="67000"/>
+                </a:schemeClr>
+              </a:gs>
+              <a:gs pos="48000">
+                <a:schemeClr val="accent5">
+                  <a:lumMod val="97000"/>
+                  <a:lumOff val="3000"/>
+                </a:schemeClr>
+              </a:gs>
+              <a:gs pos="100000">
+                <a:schemeClr val="accent5">
+                  <a:lumMod val="60000"/>
+                  <a:lumOff val="40000"/>
+                </a:schemeClr>
+              </a:gs>
+            </a:gsLst>
+            <a:lin ang="16200000" scaled="1"/>
+            <a:tileRect/>
+          </a:gradFill>
+          <a:ln w="76200" cap="flat" cmpd="sng" algn="ctr">
+            <a:solidFill>
+              <a:schemeClr val="tx1"/>
+            </a:solidFill>
+            <a:prstDash val="solid"/>
+            <a:round/>
+            <a:headEnd type="none" w="med" len="med"/>
+            <a:tailEnd type="none" w="med" len="med"/>
+          </a:ln>
+          <a:effectLst/>
+        </p:spPr>
+        <p:txBody>
+          <a:bodyPr rot="0" spcFirstLastPara="0" vertOverflow="overflow" horzOverflow="overflow" vert="horz" wrap="none" lIns="91440" tIns="45720" rIns="91440" bIns="45720" numCol="1" spcCol="0" rtlCol="0" fromWordArt="0" anchor="ctr" anchorCtr="1" forceAA="0" compatLnSpc="1">
+            <a:prstTxWarp prst="textNoShape">
+              <a:avLst/>
+            </a:prstTxWarp>
+            <a:spAutoFit/>
+          </a:bodyPr>
+          <a:lstStyle/>
+          <a:p>
+            <a:pPr marL="0" marR="0" indent="0" algn="r" defTabSz="914400" rtl="0" eaLnBrk="0" fontAlgn="base" latinLnBrk="0" hangingPunct="0">
+              <a:lnSpc>
+                <a:spcPct val="100000"/>
+              </a:lnSpc>
+              <a:spcBef>
+                <a:spcPct val="0"/>
+              </a:spcBef>
+              <a:spcAft>
+                <a:spcPct val="0"/>
+              </a:spcAft>
+              <a:buClrTx/>
+              <a:buSzTx/>
+              <a:buFontTx/>
+              <a:buNone/>
+              <a:tabLst/>
+            </a:pPr>
+            <a:endParaRPr kumimoji="0" lang="en-US" sz="2400" b="0" i="0" u="none" strike="noStrike" cap="none" normalizeH="0" baseline="0" dirty="0">
+              <a:ln>
+                <a:noFill/>
+              </a:ln>
+              <a:solidFill>
+                <a:srgbClr val="FF0066"/>
+              </a:solidFill>
+              <a:effectLst/>
+              <a:latin typeface="Arial" panose="020B0604020202020204" pitchFamily="34" charset="0"/>
+              <a:cs typeface="Arial" panose="020B0604020202020204" pitchFamily="34" charset="0"/>
+            </a:endParaRPr>
+          </a:p>
+        </p:txBody>
+      </p:sp>
+      <p:cxnSp>
+        <p:nvCxnSpPr>
+          <p:cNvPr id="12" name="Straight Connector 11">
+            <a:extLst>
+              <a:ext uri="{FF2B5EF4-FFF2-40B4-BE49-F238E27FC236}">
+                <a16:creationId xmlns:a16="http://schemas.microsoft.com/office/drawing/2014/main" id="{654DCFF1-3B63-B2C8-6148-58B223E5295E}"/>
+              </a:ext>
+            </a:extLst>
+          </p:cNvPr>
+          <p:cNvCxnSpPr/>
+          <p:nvPr/>
+        </p:nvCxnSpPr>
+        <p:spPr bwMode="auto">
+          <a:xfrm>
+            <a:off x="3600063" y="2329190"/>
+            <a:ext cx="3291840" cy="0"/>
+          </a:xfrm>
+          <a:prstGeom prst="line">
+            <a:avLst/>
+          </a:prstGeom>
+          <a:solidFill>
+            <a:srgbClr val="FFFFCC"/>
+          </a:solidFill>
+          <a:ln w="76200" cap="flat" cmpd="sng" algn="ctr">
+            <a:solidFill>
+              <a:schemeClr val="tx1"/>
+            </a:solidFill>
+            <a:prstDash val="solid"/>
+            <a:round/>
+            <a:headEnd type="none" w="med" len="med"/>
+            <a:tailEnd type="none" w="med" len="med"/>
+          </a:ln>
+          <a:effectLst/>
+        </p:spPr>
+      </p:cxnSp>
+      <p:cxnSp>
+        <p:nvCxnSpPr>
+          <p:cNvPr id="13" name="Straight Connector 12">
+            <a:extLst>
+              <a:ext uri="{FF2B5EF4-FFF2-40B4-BE49-F238E27FC236}">
+                <a16:creationId xmlns:a16="http://schemas.microsoft.com/office/drawing/2014/main" id="{6DBB0A2C-0B5B-25A6-EE16-B23A769DF3EE}"/>
+              </a:ext>
+            </a:extLst>
+          </p:cNvPr>
+          <p:cNvCxnSpPr/>
+          <p:nvPr/>
+        </p:nvCxnSpPr>
+        <p:spPr bwMode="auto">
+          <a:xfrm>
+            <a:off x="3600063" y="2773690"/>
+            <a:ext cx="3291840" cy="0"/>
+          </a:xfrm>
+          <a:prstGeom prst="line">
+            <a:avLst/>
+          </a:prstGeom>
+          <a:solidFill>
+            <a:srgbClr val="FFFFCC"/>
+          </a:solidFill>
+          <a:ln w="76200" cap="flat" cmpd="sng" algn="ctr">
+            <a:solidFill>
+              <a:schemeClr val="tx1"/>
+            </a:solidFill>
+            <a:prstDash val="solid"/>
+            <a:round/>
+            <a:headEnd type="none" w="med" len="med"/>
+            <a:tailEnd type="none" w="med" len="med"/>
+          </a:ln>
+          <a:effectLst/>
+        </p:spPr>
+      </p:cxnSp>
+      <p:cxnSp>
+        <p:nvCxnSpPr>
+          <p:cNvPr id="20" name="Straight Connector 19">
+            <a:extLst>
+              <a:ext uri="{FF2B5EF4-FFF2-40B4-BE49-F238E27FC236}">
+                <a16:creationId xmlns:a16="http://schemas.microsoft.com/office/drawing/2014/main" id="{2166DCF2-42E6-B828-0196-327C1D30B4D2}"/>
+              </a:ext>
+            </a:extLst>
+          </p:cNvPr>
+          <p:cNvCxnSpPr/>
+          <p:nvPr/>
+        </p:nvCxnSpPr>
+        <p:spPr bwMode="auto">
+          <a:xfrm>
+            <a:off x="3600063" y="3218190"/>
+            <a:ext cx="3291840" cy="0"/>
+          </a:xfrm>
+          <a:prstGeom prst="line">
+            <a:avLst/>
+          </a:prstGeom>
+          <a:solidFill>
+            <a:srgbClr val="FFFFCC"/>
+          </a:solidFill>
+          <a:ln w="76200" cap="flat" cmpd="sng" algn="ctr">
+            <a:solidFill>
+              <a:schemeClr val="tx1"/>
+            </a:solidFill>
+            <a:prstDash val="solid"/>
+            <a:round/>
+            <a:headEnd type="none" w="med" len="med"/>
+            <a:tailEnd type="none" w="med" len="med"/>
+          </a:ln>
+          <a:effectLst/>
+        </p:spPr>
+      </p:cxnSp>
+      <p:cxnSp>
+        <p:nvCxnSpPr>
+          <p:cNvPr id="24" name="Straight Connector 23">
+            <a:extLst>
+              <a:ext uri="{FF2B5EF4-FFF2-40B4-BE49-F238E27FC236}">
+                <a16:creationId xmlns:a16="http://schemas.microsoft.com/office/drawing/2014/main" id="{65D26414-6600-0E7C-46A3-33E2F7190B40}"/>
+              </a:ext>
+            </a:extLst>
+          </p:cNvPr>
+          <p:cNvCxnSpPr/>
+          <p:nvPr/>
+        </p:nvCxnSpPr>
+        <p:spPr bwMode="auto">
+          <a:xfrm>
+            <a:off x="3630542" y="4996190"/>
+            <a:ext cx="3291840" cy="0"/>
+          </a:xfrm>
+          <a:prstGeom prst="line">
+            <a:avLst/>
+          </a:prstGeom>
+          <a:solidFill>
+            <a:srgbClr val="FFFFCC"/>
+          </a:solidFill>
+          <a:ln w="76200" cap="flat" cmpd="sng" algn="ctr">
+            <a:solidFill>
+              <a:schemeClr val="tx1"/>
+            </a:solidFill>
+            <a:prstDash val="solid"/>
+            <a:round/>
+            <a:headEnd type="none" w="med" len="med"/>
+            <a:tailEnd type="none" w="med" len="med"/>
+          </a:ln>
+          <a:effectLst/>
+        </p:spPr>
+      </p:cxnSp>
+      <p:sp>
+        <p:nvSpPr>
+          <p:cNvPr id="25" name="TextBox 24">
+            <a:extLst>
+              <a:ext uri="{FF2B5EF4-FFF2-40B4-BE49-F238E27FC236}">
+                <a16:creationId xmlns:a16="http://schemas.microsoft.com/office/drawing/2014/main" id="{3C35B729-F9E7-6F75-9AB8-8F66A2CE91F1}"/>
+              </a:ext>
+            </a:extLst>
+          </p:cNvPr>
+          <p:cNvSpPr txBox="1"/>
+          <p:nvPr/>
+        </p:nvSpPr>
+        <p:spPr bwMode="auto">
+          <a:xfrm rot="5400000">
+            <a:off x="5095289" y="3680421"/>
+            <a:ext cx="697627" cy="707886"/>
+          </a:xfrm>
+          <a:prstGeom prst="rect">
+            <a:avLst/>
+          </a:prstGeom>
+          <a:noFill/>
+          <a:ln w="76200">
+            <a:noFill/>
+            <a:miter lim="800000"/>
+            <a:headEnd/>
+            <a:tailEnd/>
+          </a:ln>
+          <a:effectLst>
+            <a:outerShdw blurRad="50800" dist="38100" dir="2700000" algn="tl" rotWithShape="0">
+              <a:prstClr val="black">
+                <a:alpha val="40000"/>
+              </a:prstClr>
+            </a:outerShdw>
+          </a:effectLst>
+        </p:spPr>
+        <p:txBody>
+          <a:bodyPr wrap="none" rtlCol="0">
+            <a:spAutoFit/>
+          </a:bodyPr>
+          <a:lstStyle/>
+          <a:p>
+            <a:pPr algn="l"/>
+            <a:r>
+              <a:rPr lang="en-US" sz="4000" dirty="0">
+                <a:solidFill>
+                  <a:schemeClr val="tx1"/>
+                </a:solidFill>
+                <a:latin typeface="Arial" panose="020B0604020202020204" pitchFamily="34" charset="0"/>
+                <a:cs typeface="Arial" panose="020B0604020202020204" pitchFamily="34" charset="0"/>
+              </a:rPr>
+              <a:t>…</a:t>
+            </a:r>
+          </a:p>
+        </p:txBody>
+      </p:sp>
     </p:spTree>
     <p:extLst>
       <p:ext uri="{BB962C8B-B14F-4D97-AF65-F5344CB8AC3E}">
@@ -34353,253 +34574,6 @@
           </a:p>
         </p:txBody>
       </p:sp>
-      <p:grpSp>
-        <p:nvGrpSpPr>
-          <p:cNvPr id="14" name="Group 13"/>
-          <p:cNvGrpSpPr/>
-          <p:nvPr/>
-        </p:nvGrpSpPr>
-        <p:grpSpPr>
-          <a:xfrm>
-            <a:off x="3600063" y="1811030"/>
-            <a:ext cx="3322319" cy="3657600"/>
-            <a:chOff x="3200400" y="2331720"/>
-            <a:chExt cx="3322319" cy="3657600"/>
-          </a:xfrm>
-        </p:grpSpPr>
-        <p:sp>
-          <p:nvSpPr>
-            <p:cNvPr id="4" name="Rectangle 3"/>
-            <p:cNvSpPr/>
-            <p:nvPr/>
-          </p:nvSpPr>
-          <p:spPr bwMode="auto">
-            <a:xfrm>
-              <a:off x="3200400" y="2331720"/>
-              <a:ext cx="3291840" cy="3657600"/>
-            </a:xfrm>
-            <a:prstGeom prst="rect">
-              <a:avLst/>
-            </a:prstGeom>
-            <a:solidFill>
-              <a:srgbClr val="FFFF00"/>
-            </a:solidFill>
-            <a:ln w="76200" cap="flat" cmpd="sng" algn="ctr">
-              <a:solidFill>
-                <a:srgbClr val="FF0000"/>
-              </a:solidFill>
-              <a:prstDash val="solid"/>
-              <a:round/>
-              <a:headEnd type="none" w="med" len="med"/>
-              <a:tailEnd type="none" w="med" len="med"/>
-            </a:ln>
-            <a:effectLst/>
-          </p:spPr>
-          <p:txBody>
-            <a:bodyPr rot="0" spcFirstLastPara="0" vertOverflow="overflow" horzOverflow="overflow" vert="horz" wrap="none" lIns="91440" tIns="45720" rIns="91440" bIns="45720" numCol="1" spcCol="0" rtlCol="0" fromWordArt="0" anchor="ctr" anchorCtr="1" forceAA="0" compatLnSpc="1">
-              <a:prstTxWarp prst="textNoShape">
-                <a:avLst/>
-              </a:prstTxWarp>
-              <a:spAutoFit/>
-            </a:bodyPr>
-            <a:lstStyle/>
-            <a:p>
-              <a:pPr marL="0" marR="0" indent="0" algn="r" defTabSz="914400" rtl="0" eaLnBrk="0" fontAlgn="base" latinLnBrk="0" hangingPunct="0">
-                <a:lnSpc>
-                  <a:spcPct val="100000"/>
-                </a:lnSpc>
-                <a:spcBef>
-                  <a:spcPct val="0"/>
-                </a:spcBef>
-                <a:spcAft>
-                  <a:spcPct val="0"/>
-                </a:spcAft>
-                <a:buClrTx/>
-                <a:buSzTx/>
-                <a:buFontTx/>
-                <a:buNone/>
-                <a:tabLst/>
-              </a:pPr>
-              <a:endParaRPr kumimoji="0" lang="en-US" sz="2400" b="0" i="0" u="none" strike="noStrike" cap="none" normalizeH="0" baseline="0" dirty="0">
-                <a:ln>
-                  <a:noFill/>
-                </a:ln>
-                <a:solidFill>
-                  <a:srgbClr val="FF0066"/>
-                </a:solidFill>
-                <a:effectLst/>
-                <a:latin typeface="Arial" panose="020B0604020202020204" pitchFamily="34" charset="0"/>
-                <a:cs typeface="Arial" panose="020B0604020202020204" pitchFamily="34" charset="0"/>
-              </a:endParaRPr>
-            </a:p>
-          </p:txBody>
-        </p:sp>
-        <p:cxnSp>
-          <p:nvCxnSpPr>
-            <p:cNvPr id="6" name="Straight Connector 5"/>
-            <p:cNvCxnSpPr/>
-            <p:nvPr/>
-          </p:nvCxnSpPr>
-          <p:spPr bwMode="auto">
-            <a:xfrm>
-              <a:off x="3200400" y="2849880"/>
-              <a:ext cx="3291840" cy="0"/>
-            </a:xfrm>
-            <a:prstGeom prst="line">
-              <a:avLst/>
-            </a:prstGeom>
-            <a:solidFill>
-              <a:srgbClr val="FFFFCC"/>
-            </a:solidFill>
-            <a:ln w="76200" cap="flat" cmpd="sng" algn="ctr">
-              <a:solidFill>
-                <a:srgbClr val="FF0000"/>
-              </a:solidFill>
-              <a:prstDash val="solid"/>
-              <a:round/>
-              <a:headEnd type="none" w="med" len="med"/>
-              <a:tailEnd type="none" w="med" len="med"/>
-            </a:ln>
-            <a:effectLst/>
-          </p:spPr>
-        </p:cxnSp>
-        <p:cxnSp>
-          <p:nvCxnSpPr>
-            <p:cNvPr id="7" name="Straight Connector 6"/>
-            <p:cNvCxnSpPr/>
-            <p:nvPr/>
-          </p:nvCxnSpPr>
-          <p:spPr bwMode="auto">
-            <a:xfrm>
-              <a:off x="3200400" y="3294380"/>
-              <a:ext cx="3291840" cy="0"/>
-            </a:xfrm>
-            <a:prstGeom prst="line">
-              <a:avLst/>
-            </a:prstGeom>
-            <a:solidFill>
-              <a:srgbClr val="FFFFCC"/>
-            </a:solidFill>
-            <a:ln w="76200" cap="flat" cmpd="sng" algn="ctr">
-              <a:solidFill>
-                <a:srgbClr val="FF0000"/>
-              </a:solidFill>
-              <a:prstDash val="solid"/>
-              <a:round/>
-              <a:headEnd type="none" w="med" len="med"/>
-              <a:tailEnd type="none" w="med" len="med"/>
-            </a:ln>
-            <a:effectLst/>
-          </p:spPr>
-        </p:cxnSp>
-        <p:cxnSp>
-          <p:nvCxnSpPr>
-            <p:cNvPr id="8" name="Straight Connector 7"/>
-            <p:cNvCxnSpPr/>
-            <p:nvPr/>
-          </p:nvCxnSpPr>
-          <p:spPr bwMode="auto">
-            <a:xfrm>
-              <a:off x="3200400" y="3738880"/>
-              <a:ext cx="3291840" cy="0"/>
-            </a:xfrm>
-            <a:prstGeom prst="line">
-              <a:avLst/>
-            </a:prstGeom>
-            <a:solidFill>
-              <a:srgbClr val="FFFFCC"/>
-            </a:solidFill>
-            <a:ln w="76200" cap="flat" cmpd="sng" algn="ctr">
-              <a:solidFill>
-                <a:srgbClr val="FF0000"/>
-              </a:solidFill>
-              <a:prstDash val="solid"/>
-              <a:round/>
-              <a:headEnd type="none" w="med" len="med"/>
-              <a:tailEnd type="none" w="med" len="med"/>
-            </a:ln>
-            <a:effectLst/>
-          </p:spPr>
-        </p:cxnSp>
-        <p:cxnSp>
-          <p:nvCxnSpPr>
-            <p:cNvPr id="9" name="Straight Connector 8"/>
-            <p:cNvCxnSpPr/>
-            <p:nvPr/>
-          </p:nvCxnSpPr>
-          <p:spPr bwMode="auto">
-            <a:xfrm>
-              <a:off x="3230879" y="5516880"/>
-              <a:ext cx="3291840" cy="0"/>
-            </a:xfrm>
-            <a:prstGeom prst="line">
-              <a:avLst/>
-            </a:prstGeom>
-            <a:solidFill>
-              <a:srgbClr val="FFFFCC"/>
-            </a:solidFill>
-            <a:ln w="76200" cap="flat" cmpd="sng" algn="ctr">
-              <a:solidFill>
-                <a:srgbClr val="FF0000"/>
-              </a:solidFill>
-              <a:prstDash val="solid"/>
-              <a:round/>
-              <a:headEnd type="none" w="med" len="med"/>
-              <a:tailEnd type="none" w="med" len="med"/>
-            </a:ln>
-            <a:effectLst/>
-          </p:spPr>
-        </p:cxnSp>
-        <p:sp>
-          <p:nvSpPr>
-            <p:cNvPr id="10" name="TextBox 9"/>
-            <p:cNvSpPr txBox="1"/>
-            <p:nvPr/>
-          </p:nvSpPr>
-          <p:spPr bwMode="auto">
-            <a:xfrm rot="5400000">
-              <a:off x="4695626" y="4201111"/>
-              <a:ext cx="697627" cy="707886"/>
-            </a:xfrm>
-            <a:prstGeom prst="rect">
-              <a:avLst/>
-            </a:prstGeom>
-            <a:noFill/>
-            <a:ln w="76200">
-              <a:noFill/>
-              <a:miter lim="800000"/>
-              <a:headEnd/>
-              <a:tailEnd/>
-            </a:ln>
-            <a:effectLst>
-              <a:outerShdw blurRad="50800" dist="38100" dir="2700000" algn="tl" rotWithShape="0">
-                <a:prstClr val="black">
-                  <a:alpha val="40000"/>
-                </a:prstClr>
-              </a:outerShdw>
-            </a:effectLst>
-          </p:spPr>
-          <p:txBody>
-            <a:bodyPr wrap="none" rtlCol="0">
-              <a:spAutoFit/>
-            </a:bodyPr>
-            <a:lstStyle/>
-            <a:p>
-              <a:pPr algn="l"/>
-              <a:r>
-                <a:rPr lang="en-US" sz="4000" dirty="0">
-                  <a:solidFill>
-                    <a:srgbClr val="FF0000"/>
-                  </a:solidFill>
-                  <a:latin typeface="Arial" panose="020B0604020202020204" pitchFamily="34" charset="0"/>
-                  <a:cs typeface="Arial" panose="020B0604020202020204" pitchFamily="34" charset="0"/>
-                </a:rPr>
-                <a:t>…</a:t>
-              </a:r>
-            </a:p>
-          </p:txBody>
-        </p:sp>
-      </p:grpSp>
       <p:grpSp>
         <p:nvGrpSpPr>
           <p:cNvPr id="21" name="Group 20"/>
@@ -34954,6 +34928,489 @@
           </a:p>
         </p:txBody>
       </p:sp>
+      <p:cxnSp>
+        <p:nvCxnSpPr>
+          <p:cNvPr id="5" name="Straight Connector 4">
+            <a:extLst>
+              <a:ext uri="{FF2B5EF4-FFF2-40B4-BE49-F238E27FC236}">
+                <a16:creationId xmlns:a16="http://schemas.microsoft.com/office/drawing/2014/main" id="{97CDC361-FCE9-1916-565C-602AE834DF36}"/>
+              </a:ext>
+            </a:extLst>
+          </p:cNvPr>
+          <p:cNvCxnSpPr/>
+          <p:nvPr/>
+        </p:nvCxnSpPr>
+        <p:spPr bwMode="auto">
+          <a:xfrm>
+            <a:off x="3600063" y="2329190"/>
+            <a:ext cx="3291840" cy="0"/>
+          </a:xfrm>
+          <a:prstGeom prst="line">
+            <a:avLst/>
+          </a:prstGeom>
+          <a:solidFill>
+            <a:srgbClr val="FFFFCC"/>
+          </a:solidFill>
+          <a:ln w="76200" cap="flat" cmpd="sng" algn="ctr">
+            <a:solidFill>
+              <a:srgbClr val="FF0000"/>
+            </a:solidFill>
+            <a:prstDash val="solid"/>
+            <a:round/>
+            <a:headEnd type="none" w="med" len="med"/>
+            <a:tailEnd type="none" w="med" len="med"/>
+          </a:ln>
+          <a:effectLst/>
+        </p:spPr>
+      </p:cxnSp>
+      <p:cxnSp>
+        <p:nvCxnSpPr>
+          <p:cNvPr id="11" name="Straight Connector 10">
+            <a:extLst>
+              <a:ext uri="{FF2B5EF4-FFF2-40B4-BE49-F238E27FC236}">
+                <a16:creationId xmlns:a16="http://schemas.microsoft.com/office/drawing/2014/main" id="{E1CC64A2-42A9-5137-5E28-B1E2D62ADDBC}"/>
+              </a:ext>
+            </a:extLst>
+          </p:cNvPr>
+          <p:cNvCxnSpPr/>
+          <p:nvPr/>
+        </p:nvCxnSpPr>
+        <p:spPr bwMode="auto">
+          <a:xfrm>
+            <a:off x="3600063" y="2773690"/>
+            <a:ext cx="3291840" cy="0"/>
+          </a:xfrm>
+          <a:prstGeom prst="line">
+            <a:avLst/>
+          </a:prstGeom>
+          <a:solidFill>
+            <a:srgbClr val="FFFFCC"/>
+          </a:solidFill>
+          <a:ln w="76200" cap="flat" cmpd="sng" algn="ctr">
+            <a:solidFill>
+              <a:srgbClr val="FF0000"/>
+            </a:solidFill>
+            <a:prstDash val="solid"/>
+            <a:round/>
+            <a:headEnd type="none" w="med" len="med"/>
+            <a:tailEnd type="none" w="med" len="med"/>
+          </a:ln>
+          <a:effectLst/>
+        </p:spPr>
+      </p:cxnSp>
+      <p:cxnSp>
+        <p:nvCxnSpPr>
+          <p:cNvPr id="12" name="Straight Connector 11">
+            <a:extLst>
+              <a:ext uri="{FF2B5EF4-FFF2-40B4-BE49-F238E27FC236}">
+                <a16:creationId xmlns:a16="http://schemas.microsoft.com/office/drawing/2014/main" id="{1D103D89-5F33-A133-0413-077DF5A06150}"/>
+              </a:ext>
+            </a:extLst>
+          </p:cNvPr>
+          <p:cNvCxnSpPr/>
+          <p:nvPr/>
+        </p:nvCxnSpPr>
+        <p:spPr bwMode="auto">
+          <a:xfrm>
+            <a:off x="3600063" y="3218190"/>
+            <a:ext cx="3291840" cy="0"/>
+          </a:xfrm>
+          <a:prstGeom prst="line">
+            <a:avLst/>
+          </a:prstGeom>
+          <a:solidFill>
+            <a:srgbClr val="FFFFCC"/>
+          </a:solidFill>
+          <a:ln w="76200" cap="flat" cmpd="sng" algn="ctr">
+            <a:solidFill>
+              <a:srgbClr val="FF0000"/>
+            </a:solidFill>
+            <a:prstDash val="solid"/>
+            <a:round/>
+            <a:headEnd type="none" w="med" len="med"/>
+            <a:tailEnd type="none" w="med" len="med"/>
+          </a:ln>
+          <a:effectLst/>
+        </p:spPr>
+      </p:cxnSp>
+      <p:cxnSp>
+        <p:nvCxnSpPr>
+          <p:cNvPr id="13" name="Straight Connector 12">
+            <a:extLst>
+              <a:ext uri="{FF2B5EF4-FFF2-40B4-BE49-F238E27FC236}">
+                <a16:creationId xmlns:a16="http://schemas.microsoft.com/office/drawing/2014/main" id="{BD292262-01E1-D67E-DAF4-301107ABDDE2}"/>
+              </a:ext>
+            </a:extLst>
+          </p:cNvPr>
+          <p:cNvCxnSpPr/>
+          <p:nvPr/>
+        </p:nvCxnSpPr>
+        <p:spPr bwMode="auto">
+          <a:xfrm>
+            <a:off x="3630542" y="4996190"/>
+            <a:ext cx="3291840" cy="0"/>
+          </a:xfrm>
+          <a:prstGeom prst="line">
+            <a:avLst/>
+          </a:prstGeom>
+          <a:solidFill>
+            <a:srgbClr val="FFFFCC"/>
+          </a:solidFill>
+          <a:ln w="76200" cap="flat" cmpd="sng" algn="ctr">
+            <a:solidFill>
+              <a:srgbClr val="FF0000"/>
+            </a:solidFill>
+            <a:prstDash val="solid"/>
+            <a:round/>
+            <a:headEnd type="none" w="med" len="med"/>
+            <a:tailEnd type="none" w="med" len="med"/>
+          </a:ln>
+          <a:effectLst/>
+        </p:spPr>
+      </p:cxnSp>
+      <p:sp>
+        <p:nvSpPr>
+          <p:cNvPr id="20" name="TextBox 19">
+            <a:extLst>
+              <a:ext uri="{FF2B5EF4-FFF2-40B4-BE49-F238E27FC236}">
+                <a16:creationId xmlns:a16="http://schemas.microsoft.com/office/drawing/2014/main" id="{8B9A1800-7C09-1AC3-67FA-75E478CAEF69}"/>
+              </a:ext>
+            </a:extLst>
+          </p:cNvPr>
+          <p:cNvSpPr txBox="1"/>
+          <p:nvPr/>
+        </p:nvSpPr>
+        <p:spPr bwMode="auto">
+          <a:xfrm rot="5400000">
+            <a:off x="5095289" y="3680421"/>
+            <a:ext cx="697627" cy="707886"/>
+          </a:xfrm>
+          <a:prstGeom prst="rect">
+            <a:avLst/>
+          </a:prstGeom>
+          <a:noFill/>
+          <a:ln w="76200">
+            <a:noFill/>
+            <a:miter lim="800000"/>
+            <a:headEnd/>
+            <a:tailEnd/>
+          </a:ln>
+          <a:effectLst>
+            <a:outerShdw blurRad="50800" dist="38100" dir="2700000" algn="tl" rotWithShape="0">
+              <a:prstClr val="black">
+                <a:alpha val="40000"/>
+              </a:prstClr>
+            </a:outerShdw>
+          </a:effectLst>
+        </p:spPr>
+        <p:txBody>
+          <a:bodyPr wrap="none" rtlCol="0">
+            <a:spAutoFit/>
+          </a:bodyPr>
+          <a:lstStyle/>
+          <a:p>
+            <a:pPr algn="l"/>
+            <a:r>
+              <a:rPr lang="en-US" sz="4000" dirty="0">
+                <a:solidFill>
+                  <a:srgbClr val="FF0000"/>
+                </a:solidFill>
+                <a:latin typeface="Arial" panose="020B0604020202020204" pitchFamily="34" charset="0"/>
+                <a:cs typeface="Arial" panose="020B0604020202020204" pitchFamily="34" charset="0"/>
+              </a:rPr>
+              <a:t>…</a:t>
+            </a:r>
+          </a:p>
+        </p:txBody>
+      </p:sp>
+      <p:sp>
+        <p:nvSpPr>
+          <p:cNvPr id="24" name="Rectangle 23">
+            <a:extLst>
+              <a:ext uri="{FF2B5EF4-FFF2-40B4-BE49-F238E27FC236}">
+                <a16:creationId xmlns:a16="http://schemas.microsoft.com/office/drawing/2014/main" id="{548101D9-F4BB-B83A-8FEC-11FDB57E8744}"/>
+              </a:ext>
+            </a:extLst>
+          </p:cNvPr>
+          <p:cNvSpPr/>
+          <p:nvPr/>
+        </p:nvSpPr>
+        <p:spPr bwMode="auto">
+          <a:xfrm>
+            <a:off x="3600063" y="1811030"/>
+            <a:ext cx="3291840" cy="3657600"/>
+          </a:xfrm>
+          <a:prstGeom prst="rect">
+            <a:avLst/>
+          </a:prstGeom>
+          <a:gradFill flip="none" rotWithShape="1">
+            <a:gsLst>
+              <a:gs pos="0">
+                <a:schemeClr val="accent5">
+                  <a:lumMod val="67000"/>
+                </a:schemeClr>
+              </a:gs>
+              <a:gs pos="48000">
+                <a:schemeClr val="accent5">
+                  <a:lumMod val="97000"/>
+                  <a:lumOff val="3000"/>
+                </a:schemeClr>
+              </a:gs>
+              <a:gs pos="100000">
+                <a:schemeClr val="accent5">
+                  <a:lumMod val="60000"/>
+                  <a:lumOff val="40000"/>
+                </a:schemeClr>
+              </a:gs>
+            </a:gsLst>
+            <a:lin ang="16200000" scaled="1"/>
+            <a:tileRect/>
+          </a:gradFill>
+          <a:ln w="76200" cap="flat" cmpd="sng" algn="ctr">
+            <a:solidFill>
+              <a:schemeClr val="tx1"/>
+            </a:solidFill>
+            <a:prstDash val="solid"/>
+            <a:round/>
+            <a:headEnd type="none" w="med" len="med"/>
+            <a:tailEnd type="none" w="med" len="med"/>
+          </a:ln>
+          <a:effectLst/>
+        </p:spPr>
+        <p:txBody>
+          <a:bodyPr rot="0" spcFirstLastPara="0" vertOverflow="overflow" horzOverflow="overflow" vert="horz" wrap="none" lIns="91440" tIns="45720" rIns="91440" bIns="45720" numCol="1" spcCol="0" rtlCol="0" fromWordArt="0" anchor="ctr" anchorCtr="1" forceAA="0" compatLnSpc="1">
+            <a:prstTxWarp prst="textNoShape">
+              <a:avLst/>
+            </a:prstTxWarp>
+            <a:spAutoFit/>
+          </a:bodyPr>
+          <a:lstStyle/>
+          <a:p>
+            <a:pPr marL="0" marR="0" indent="0" algn="r" defTabSz="914400" rtl="0" eaLnBrk="0" fontAlgn="base" latinLnBrk="0" hangingPunct="0">
+              <a:lnSpc>
+                <a:spcPct val="100000"/>
+              </a:lnSpc>
+              <a:spcBef>
+                <a:spcPct val="0"/>
+              </a:spcBef>
+              <a:spcAft>
+                <a:spcPct val="0"/>
+              </a:spcAft>
+              <a:buClrTx/>
+              <a:buSzTx/>
+              <a:buFontTx/>
+              <a:buNone/>
+              <a:tabLst/>
+            </a:pPr>
+            <a:endParaRPr kumimoji="0" lang="en-US" sz="2400" b="0" i="0" u="none" strike="noStrike" cap="none" normalizeH="0" baseline="0" dirty="0">
+              <a:ln>
+                <a:noFill/>
+              </a:ln>
+              <a:solidFill>
+                <a:srgbClr val="FF0066"/>
+              </a:solidFill>
+              <a:effectLst/>
+              <a:latin typeface="Arial" panose="020B0604020202020204" pitchFamily="34" charset="0"/>
+              <a:cs typeface="Arial" panose="020B0604020202020204" pitchFamily="34" charset="0"/>
+            </a:endParaRPr>
+          </a:p>
+        </p:txBody>
+      </p:sp>
+      <p:cxnSp>
+        <p:nvCxnSpPr>
+          <p:cNvPr id="25" name="Straight Connector 24">
+            <a:extLst>
+              <a:ext uri="{FF2B5EF4-FFF2-40B4-BE49-F238E27FC236}">
+                <a16:creationId xmlns:a16="http://schemas.microsoft.com/office/drawing/2014/main" id="{5DF12517-D487-32A4-DA5B-FAEDDE18B217}"/>
+              </a:ext>
+            </a:extLst>
+          </p:cNvPr>
+          <p:cNvCxnSpPr/>
+          <p:nvPr/>
+        </p:nvCxnSpPr>
+        <p:spPr bwMode="auto">
+          <a:xfrm>
+            <a:off x="3600063" y="2329190"/>
+            <a:ext cx="3291840" cy="0"/>
+          </a:xfrm>
+          <a:prstGeom prst="line">
+            <a:avLst/>
+          </a:prstGeom>
+          <a:solidFill>
+            <a:srgbClr val="FFFFCC"/>
+          </a:solidFill>
+          <a:ln w="76200" cap="flat" cmpd="sng" algn="ctr">
+            <a:solidFill>
+              <a:schemeClr val="tx1"/>
+            </a:solidFill>
+            <a:prstDash val="solid"/>
+            <a:round/>
+            <a:headEnd type="none" w="med" len="med"/>
+            <a:tailEnd type="none" w="med" len="med"/>
+          </a:ln>
+          <a:effectLst/>
+        </p:spPr>
+      </p:cxnSp>
+      <p:cxnSp>
+        <p:nvCxnSpPr>
+          <p:cNvPr id="26" name="Straight Connector 25">
+            <a:extLst>
+              <a:ext uri="{FF2B5EF4-FFF2-40B4-BE49-F238E27FC236}">
+                <a16:creationId xmlns:a16="http://schemas.microsoft.com/office/drawing/2014/main" id="{2E1A5F7E-A0F4-D83C-363F-A133BF0A7798}"/>
+              </a:ext>
+            </a:extLst>
+          </p:cNvPr>
+          <p:cNvCxnSpPr/>
+          <p:nvPr/>
+        </p:nvCxnSpPr>
+        <p:spPr bwMode="auto">
+          <a:xfrm>
+            <a:off x="3600063" y="2773690"/>
+            <a:ext cx="3291840" cy="0"/>
+          </a:xfrm>
+          <a:prstGeom prst="line">
+            <a:avLst/>
+          </a:prstGeom>
+          <a:solidFill>
+            <a:srgbClr val="FFFFCC"/>
+          </a:solidFill>
+          <a:ln w="76200" cap="flat" cmpd="sng" algn="ctr">
+            <a:solidFill>
+              <a:schemeClr val="tx1"/>
+            </a:solidFill>
+            <a:prstDash val="solid"/>
+            <a:round/>
+            <a:headEnd type="none" w="med" len="med"/>
+            <a:tailEnd type="none" w="med" len="med"/>
+          </a:ln>
+          <a:effectLst/>
+        </p:spPr>
+      </p:cxnSp>
+      <p:cxnSp>
+        <p:nvCxnSpPr>
+          <p:cNvPr id="27" name="Straight Connector 26">
+            <a:extLst>
+              <a:ext uri="{FF2B5EF4-FFF2-40B4-BE49-F238E27FC236}">
+                <a16:creationId xmlns:a16="http://schemas.microsoft.com/office/drawing/2014/main" id="{B9298FD3-9A48-E7DB-F7D7-403B0274F79D}"/>
+              </a:ext>
+            </a:extLst>
+          </p:cNvPr>
+          <p:cNvCxnSpPr/>
+          <p:nvPr/>
+        </p:nvCxnSpPr>
+        <p:spPr bwMode="auto">
+          <a:xfrm>
+            <a:off x="3600063" y="3218190"/>
+            <a:ext cx="3291840" cy="0"/>
+          </a:xfrm>
+          <a:prstGeom prst="line">
+            <a:avLst/>
+          </a:prstGeom>
+          <a:solidFill>
+            <a:srgbClr val="FFFFCC"/>
+          </a:solidFill>
+          <a:ln w="76200" cap="flat" cmpd="sng" algn="ctr">
+            <a:solidFill>
+              <a:schemeClr val="tx1"/>
+            </a:solidFill>
+            <a:prstDash val="solid"/>
+            <a:round/>
+            <a:headEnd type="none" w="med" len="med"/>
+            <a:tailEnd type="none" w="med" len="med"/>
+          </a:ln>
+          <a:effectLst/>
+        </p:spPr>
+      </p:cxnSp>
+      <p:cxnSp>
+        <p:nvCxnSpPr>
+          <p:cNvPr id="28" name="Straight Connector 27">
+            <a:extLst>
+              <a:ext uri="{FF2B5EF4-FFF2-40B4-BE49-F238E27FC236}">
+                <a16:creationId xmlns:a16="http://schemas.microsoft.com/office/drawing/2014/main" id="{F344338D-42CA-3657-C5C8-1A247BBEDFB3}"/>
+              </a:ext>
+            </a:extLst>
+          </p:cNvPr>
+          <p:cNvCxnSpPr/>
+          <p:nvPr/>
+        </p:nvCxnSpPr>
+        <p:spPr bwMode="auto">
+          <a:xfrm>
+            <a:off x="3630542" y="4996190"/>
+            <a:ext cx="3291840" cy="0"/>
+          </a:xfrm>
+          <a:prstGeom prst="line">
+            <a:avLst/>
+          </a:prstGeom>
+          <a:solidFill>
+            <a:srgbClr val="FFFFCC"/>
+          </a:solidFill>
+          <a:ln w="76200" cap="flat" cmpd="sng" algn="ctr">
+            <a:solidFill>
+              <a:schemeClr val="tx1"/>
+            </a:solidFill>
+            <a:prstDash val="solid"/>
+            <a:round/>
+            <a:headEnd type="none" w="med" len="med"/>
+            <a:tailEnd type="none" w="med" len="med"/>
+          </a:ln>
+          <a:effectLst/>
+        </p:spPr>
+      </p:cxnSp>
+      <p:sp>
+        <p:nvSpPr>
+          <p:cNvPr id="29" name="TextBox 28">
+            <a:extLst>
+              <a:ext uri="{FF2B5EF4-FFF2-40B4-BE49-F238E27FC236}">
+                <a16:creationId xmlns:a16="http://schemas.microsoft.com/office/drawing/2014/main" id="{288E65D4-C000-05E4-0355-537B7C53FD2C}"/>
+              </a:ext>
+            </a:extLst>
+          </p:cNvPr>
+          <p:cNvSpPr txBox="1"/>
+          <p:nvPr/>
+        </p:nvSpPr>
+        <p:spPr bwMode="auto">
+          <a:xfrm rot="5400000">
+            <a:off x="5095289" y="3680421"/>
+            <a:ext cx="697627" cy="707886"/>
+          </a:xfrm>
+          <a:prstGeom prst="rect">
+            <a:avLst/>
+          </a:prstGeom>
+          <a:noFill/>
+          <a:ln w="76200">
+            <a:noFill/>
+            <a:miter lim="800000"/>
+            <a:headEnd/>
+            <a:tailEnd/>
+          </a:ln>
+          <a:effectLst>
+            <a:outerShdw blurRad="50800" dist="38100" dir="2700000" algn="tl" rotWithShape="0">
+              <a:prstClr val="black">
+                <a:alpha val="40000"/>
+              </a:prstClr>
+            </a:outerShdw>
+          </a:effectLst>
+        </p:spPr>
+        <p:txBody>
+          <a:bodyPr wrap="none" rtlCol="0">
+            <a:spAutoFit/>
+          </a:bodyPr>
+          <a:lstStyle/>
+          <a:p>
+            <a:pPr algn="l"/>
+            <a:r>
+              <a:rPr lang="en-US" sz="4000" dirty="0">
+                <a:solidFill>
+                  <a:schemeClr val="tx1"/>
+                </a:solidFill>
+                <a:latin typeface="Arial" panose="020B0604020202020204" pitchFamily="34" charset="0"/>
+                <a:cs typeface="Arial" panose="020B0604020202020204" pitchFamily="34" charset="0"/>
+              </a:rPr>
+              <a:t>…</a:t>
+            </a:r>
+          </a:p>
+        </p:txBody>
+      </p:sp>
     </p:spTree>
     <p:extLst>
       <p:ext uri="{BB962C8B-B14F-4D97-AF65-F5344CB8AC3E}">
@@ -35039,337 +35496,349 @@
           </a:p>
         </p:txBody>
       </p:sp>
-      <p:grpSp>
-        <p:nvGrpSpPr>
-          <p:cNvPr id="20" name="Group 19"/>
-          <p:cNvGrpSpPr/>
+      <p:sp>
+        <p:nvSpPr>
+          <p:cNvPr id="4" name="Rectangle 3"/>
+          <p:cNvSpPr/>
           <p:nvPr/>
-        </p:nvGrpSpPr>
-        <p:grpSpPr>
+        </p:nvSpPr>
+        <p:spPr bwMode="auto">
           <a:xfrm>
-            <a:off x="5079072" y="1907118"/>
-            <a:ext cx="1975835" cy="4909810"/>
-            <a:chOff x="3569216" y="1811030"/>
-            <a:chExt cx="1975835" cy="4909810"/>
+            <a:off x="5109919" y="1907118"/>
+            <a:ext cx="1914144" cy="3657600"/>
           </a:xfrm>
-        </p:grpSpPr>
-        <p:sp>
-          <p:nvSpPr>
-            <p:cNvPr id="4" name="Rectangle 3"/>
-            <p:cNvSpPr/>
-            <p:nvPr/>
-          </p:nvSpPr>
-          <p:spPr bwMode="auto">
-            <a:xfrm>
-              <a:off x="3600063" y="1811030"/>
-              <a:ext cx="1914144" cy="3657600"/>
-            </a:xfrm>
-            <a:prstGeom prst="rect">
+          <a:prstGeom prst="rect">
+            <a:avLst/>
+          </a:prstGeom>
+          <a:gradFill flip="none" rotWithShape="1">
+            <a:gsLst>
+              <a:gs pos="0">
+                <a:schemeClr val="accent6">
+                  <a:lumMod val="5000"/>
+                  <a:lumOff val="95000"/>
+                </a:schemeClr>
+              </a:gs>
+              <a:gs pos="74000">
+                <a:schemeClr val="accent6">
+                  <a:lumMod val="45000"/>
+                  <a:lumOff val="55000"/>
+                </a:schemeClr>
+              </a:gs>
+              <a:gs pos="83000">
+                <a:schemeClr val="accent6">
+                  <a:lumMod val="45000"/>
+                  <a:lumOff val="55000"/>
+                </a:schemeClr>
+              </a:gs>
+              <a:gs pos="100000">
+                <a:schemeClr val="accent6">
+                  <a:lumMod val="30000"/>
+                  <a:lumOff val="70000"/>
+                </a:schemeClr>
+              </a:gs>
+            </a:gsLst>
+            <a:lin ang="5400000" scaled="1"/>
+            <a:tileRect/>
+          </a:gradFill>
+          <a:ln w="76200" cap="flat" cmpd="sng" algn="ctr">
+            <a:solidFill>
+              <a:schemeClr val="tx1"/>
+            </a:solidFill>
+            <a:prstDash val="solid"/>
+            <a:round/>
+            <a:headEnd type="none" w="med" len="med"/>
+            <a:tailEnd type="none" w="med" len="med"/>
+          </a:ln>
+          <a:effectLst/>
+        </p:spPr>
+        <p:txBody>
+          <a:bodyPr rot="0" spcFirstLastPara="0" vertOverflow="overflow" horzOverflow="overflow" vert="horz" wrap="square" lIns="91440" tIns="45720" rIns="91440" bIns="45720" numCol="1" spcCol="0" rtlCol="0" fromWordArt="0" anchor="ctr" anchorCtr="1" forceAA="0" compatLnSpc="1">
+            <a:prstTxWarp prst="textNoShape">
               <a:avLst/>
-            </a:prstGeom>
+            </a:prstTxWarp>
+            <a:spAutoFit/>
+          </a:bodyPr>
+          <a:lstStyle/>
+          <a:p>
+            <a:pPr marL="0" marR="0" indent="0" algn="r" defTabSz="914400" rtl="0" eaLnBrk="0" fontAlgn="base" latinLnBrk="0" hangingPunct="0">
+              <a:lnSpc>
+                <a:spcPct val="100000"/>
+              </a:lnSpc>
+              <a:spcBef>
+                <a:spcPct val="0"/>
+              </a:spcBef>
+              <a:spcAft>
+                <a:spcPct val="0"/>
+              </a:spcAft>
+              <a:buClrTx/>
+              <a:buSzTx/>
+              <a:buFontTx/>
+              <a:buNone/>
+              <a:tabLst/>
+            </a:pPr>
+            <a:endParaRPr kumimoji="0" lang="en-US" sz="2400" b="0" i="0" u="none" strike="noStrike" cap="none" normalizeH="0" baseline="0" dirty="0">
+              <a:ln>
+                <a:noFill/>
+              </a:ln>
+              <a:solidFill>
+                <a:srgbClr val="FF0066"/>
+              </a:solidFill>
+              <a:effectLst/>
+              <a:latin typeface="Arial" panose="020B0604020202020204" pitchFamily="34" charset="0"/>
+              <a:cs typeface="Arial" panose="020B0604020202020204" pitchFamily="34" charset="0"/>
+            </a:endParaRPr>
+          </a:p>
+        </p:txBody>
+      </p:sp>
+      <p:cxnSp>
+        <p:nvCxnSpPr>
+          <p:cNvPr id="6" name="Straight Connector 5"/>
+          <p:cNvCxnSpPr/>
+          <p:nvPr/>
+        </p:nvCxnSpPr>
+        <p:spPr bwMode="auto">
+          <a:xfrm>
+            <a:off x="5109919" y="2425278"/>
+            <a:ext cx="1844039" cy="0"/>
+          </a:xfrm>
+          <a:prstGeom prst="line">
+            <a:avLst/>
+          </a:prstGeom>
+          <a:solidFill>
+            <a:srgbClr val="FFFFCC"/>
+          </a:solidFill>
+          <a:ln w="76200" cap="flat" cmpd="sng" algn="ctr">
+            <a:solidFill>
+              <a:schemeClr val="tx1"/>
+            </a:solidFill>
+            <a:prstDash val="solid"/>
+            <a:round/>
+            <a:headEnd type="none" w="med" len="med"/>
+            <a:tailEnd type="none" w="med" len="med"/>
+          </a:ln>
+          <a:effectLst/>
+        </p:spPr>
+      </p:cxnSp>
+      <p:cxnSp>
+        <p:nvCxnSpPr>
+          <p:cNvPr id="7" name="Straight Connector 6"/>
+          <p:cNvCxnSpPr/>
+          <p:nvPr/>
+        </p:nvCxnSpPr>
+        <p:spPr bwMode="auto">
+          <a:xfrm>
+            <a:off x="5109919" y="2869778"/>
+            <a:ext cx="1844039" cy="0"/>
+          </a:xfrm>
+          <a:prstGeom prst="line">
+            <a:avLst/>
+          </a:prstGeom>
+          <a:solidFill>
+            <a:srgbClr val="FFFFCC"/>
+          </a:solidFill>
+          <a:ln w="76200" cap="flat" cmpd="sng" algn="ctr">
+            <a:solidFill>
+              <a:schemeClr val="tx1"/>
+            </a:solidFill>
+            <a:prstDash val="solid"/>
+            <a:round/>
+            <a:headEnd type="none" w="med" len="med"/>
+            <a:tailEnd type="none" w="med" len="med"/>
+          </a:ln>
+          <a:effectLst/>
+        </p:spPr>
+      </p:cxnSp>
+      <p:cxnSp>
+        <p:nvCxnSpPr>
+          <p:cNvPr id="8" name="Straight Connector 7"/>
+          <p:cNvCxnSpPr/>
+          <p:nvPr/>
+        </p:nvCxnSpPr>
+        <p:spPr bwMode="auto">
+          <a:xfrm>
+            <a:off x="5109919" y="3314278"/>
+            <a:ext cx="1844039" cy="0"/>
+          </a:xfrm>
+          <a:prstGeom prst="line">
+            <a:avLst/>
+          </a:prstGeom>
+          <a:solidFill>
+            <a:srgbClr val="FFFFCC"/>
+          </a:solidFill>
+          <a:ln w="76200" cap="flat" cmpd="sng" algn="ctr">
+            <a:solidFill>
+              <a:schemeClr val="tx1"/>
+            </a:solidFill>
+            <a:prstDash val="solid"/>
+            <a:round/>
+            <a:headEnd type="none" w="med" len="med"/>
+            <a:tailEnd type="none" w="med" len="med"/>
+          </a:ln>
+          <a:effectLst/>
+        </p:spPr>
+      </p:cxnSp>
+      <p:cxnSp>
+        <p:nvCxnSpPr>
+          <p:cNvPr id="9" name="Straight Connector 8"/>
+          <p:cNvCxnSpPr/>
+          <p:nvPr/>
+        </p:nvCxnSpPr>
+        <p:spPr bwMode="auto">
+          <a:xfrm>
+            <a:off x="5140398" y="5092278"/>
+            <a:ext cx="1813560" cy="0"/>
+          </a:xfrm>
+          <a:prstGeom prst="line">
+            <a:avLst/>
+          </a:prstGeom>
+          <a:solidFill>
+            <a:srgbClr val="FFFFCC"/>
+          </a:solidFill>
+          <a:ln w="76200" cap="flat" cmpd="sng" algn="ctr">
+            <a:solidFill>
+              <a:schemeClr val="tx1"/>
+            </a:solidFill>
+            <a:prstDash val="solid"/>
+            <a:round/>
+            <a:headEnd type="none" w="med" len="med"/>
+            <a:tailEnd type="none" w="med" len="med"/>
+          </a:ln>
+          <a:effectLst/>
+        </p:spPr>
+      </p:cxnSp>
+      <p:sp>
+        <p:nvSpPr>
+          <p:cNvPr id="10" name="TextBox 9"/>
+          <p:cNvSpPr txBox="1"/>
+          <p:nvPr/>
+        </p:nvSpPr>
+        <p:spPr bwMode="auto">
+          <a:xfrm rot="5400000">
+            <a:off x="5926964" y="3695695"/>
+            <a:ext cx="697627" cy="707886"/>
+          </a:xfrm>
+          <a:prstGeom prst="rect">
+            <a:avLst/>
+          </a:prstGeom>
+          <a:noFill/>
+          <a:ln w="76200">
+            <a:noFill/>
+            <a:miter lim="800000"/>
+            <a:headEnd/>
+            <a:tailEnd/>
+          </a:ln>
+          <a:effectLst>
+            <a:outerShdw blurRad="50800" dist="38100" dir="2700000" algn="tl" rotWithShape="0">
+              <a:prstClr val="black">
+                <a:alpha val="40000"/>
+              </a:prstClr>
+            </a:outerShdw>
+          </a:effectLst>
+        </p:spPr>
+        <p:txBody>
+          <a:bodyPr wrap="none" rtlCol="0">
+            <a:spAutoFit/>
+          </a:bodyPr>
+          <a:lstStyle/>
+          <a:p>
+            <a:pPr algn="l"/>
+            <a:r>
+              <a:rPr lang="en-US" sz="4000" dirty="0">
+                <a:solidFill>
+                  <a:srgbClr val="FF0000"/>
+                </a:solidFill>
+                <a:latin typeface="Arial" panose="020B0604020202020204" pitchFamily="34" charset="0"/>
+                <a:cs typeface="Arial" panose="020B0604020202020204" pitchFamily="34" charset="0"/>
+              </a:rPr>
+              <a:t>…</a:t>
+            </a:r>
+          </a:p>
+        </p:txBody>
+      </p:sp>
+      <p:sp>
+        <p:nvSpPr>
+          <p:cNvPr id="17" name="Right Brace 16"/>
+          <p:cNvSpPr/>
+          <p:nvPr/>
+        </p:nvSpPr>
+        <p:spPr bwMode="auto">
+          <a:xfrm rot="5400000">
+            <a:off x="5708850" y="4934941"/>
+            <a:ext cx="716280" cy="1975835"/>
+          </a:xfrm>
+          <a:prstGeom prst="rightBrace">
+            <a:avLst/>
+          </a:prstGeom>
+          <a:noFill/>
+          <a:ln w="76200" cap="flat" cmpd="sng" algn="ctr">
             <a:solidFill>
               <a:srgbClr val="FFFF00"/>
             </a:solidFill>
-            <a:ln w="76200" cap="flat" cmpd="sng" algn="ctr">
-              <a:solidFill>
-                <a:srgbClr val="FF0000"/>
-              </a:solidFill>
-              <a:prstDash val="solid"/>
-              <a:round/>
-              <a:headEnd type="none" w="med" len="med"/>
-              <a:tailEnd type="none" w="med" len="med"/>
-            </a:ln>
-            <a:effectLst/>
-          </p:spPr>
-          <p:txBody>
-            <a:bodyPr rot="0" spcFirstLastPara="0" vertOverflow="overflow" horzOverflow="overflow" vert="horz" wrap="square" lIns="91440" tIns="45720" rIns="91440" bIns="45720" numCol="1" spcCol="0" rtlCol="0" fromWordArt="0" anchor="ctr" anchorCtr="1" forceAA="0" compatLnSpc="1">
-              <a:prstTxWarp prst="textNoShape">
-                <a:avLst/>
-              </a:prstTxWarp>
-              <a:spAutoFit/>
-            </a:bodyPr>
-            <a:lstStyle/>
-            <a:p>
-              <a:pPr marL="0" marR="0" indent="0" algn="r" defTabSz="914400" rtl="0" eaLnBrk="0" fontAlgn="base" latinLnBrk="0" hangingPunct="0">
-                <a:lnSpc>
-                  <a:spcPct val="100000"/>
-                </a:lnSpc>
-                <a:spcBef>
-                  <a:spcPct val="0"/>
-                </a:spcBef>
-                <a:spcAft>
-                  <a:spcPct val="0"/>
-                </a:spcAft>
-                <a:buClrTx/>
-                <a:buSzTx/>
-                <a:buFontTx/>
-                <a:buNone/>
-                <a:tabLst/>
-              </a:pPr>
-              <a:endParaRPr kumimoji="0" lang="en-US" sz="2400" b="0" i="0" u="none" strike="noStrike" cap="none" normalizeH="0" baseline="0" dirty="0">
-                <a:ln>
-                  <a:noFill/>
-                </a:ln>
+            <a:prstDash val="solid"/>
+            <a:round/>
+            <a:headEnd type="none" w="med" len="med"/>
+            <a:tailEnd type="none" w="med" len="med"/>
+          </a:ln>
+          <a:effectLst/>
+        </p:spPr>
+        <p:txBody>
+          <a:bodyPr rtlCol="0" anchor="ctr"/>
+          <a:lstStyle/>
+          <a:p>
+            <a:pPr algn="ctr"/>
+            <a:endParaRPr lang="en-US" dirty="0"/>
+          </a:p>
+        </p:txBody>
+      </p:sp>
+      <p:sp>
+        <p:nvSpPr>
+          <p:cNvPr id="18" name="TextBox 17"/>
+          <p:cNvSpPr txBox="1"/>
+          <p:nvPr/>
+        </p:nvSpPr>
+        <p:spPr bwMode="auto">
+          <a:xfrm>
+            <a:off x="5545052" y="6293708"/>
+            <a:ext cx="1043876" cy="523220"/>
+          </a:xfrm>
+          <a:prstGeom prst="rect">
+            <a:avLst/>
+          </a:prstGeom>
+          <a:noFill/>
+          <a:ln w="76200">
+            <a:noFill/>
+            <a:miter lim="800000"/>
+            <a:headEnd/>
+            <a:tailEnd/>
+          </a:ln>
+          <a:effectLst>
+            <a:outerShdw blurRad="50800" dist="38100" dir="2700000" algn="tl" rotWithShape="0">
+              <a:prstClr val="black">
+                <a:alpha val="40000"/>
+              </a:prstClr>
+            </a:outerShdw>
+          </a:effectLst>
+        </p:spPr>
+        <p:txBody>
+          <a:bodyPr wrap="none" rtlCol="0">
+            <a:spAutoFit/>
+          </a:bodyPr>
+          <a:lstStyle/>
+          <a:p>
+            <a:pPr algn="l"/>
+            <a:r>
+              <a:rPr lang="en-US" sz="2800" dirty="0">
                 <a:solidFill>
-                  <a:srgbClr val="FF0066"/>
+                  <a:srgbClr val="FFFF00"/>
                 </a:solidFill>
-                <a:effectLst/>
                 <a:latin typeface="Arial" panose="020B0604020202020204" pitchFamily="34" charset="0"/>
                 <a:cs typeface="Arial" panose="020B0604020202020204" pitchFamily="34" charset="0"/>
-              </a:endParaRPr>
-            </a:p>
-          </p:txBody>
-        </p:sp>
-        <p:cxnSp>
-          <p:nvCxnSpPr>
-            <p:cNvPr id="6" name="Straight Connector 5"/>
-            <p:cNvCxnSpPr/>
-            <p:nvPr/>
-          </p:nvCxnSpPr>
-          <p:spPr bwMode="auto">
-            <a:xfrm>
-              <a:off x="3600063" y="2329190"/>
-              <a:ext cx="1844039" cy="0"/>
-            </a:xfrm>
-            <a:prstGeom prst="line">
-              <a:avLst/>
-            </a:prstGeom>
-            <a:solidFill>
-              <a:srgbClr val="FFFFCC"/>
-            </a:solidFill>
-            <a:ln w="76200" cap="flat" cmpd="sng" algn="ctr">
-              <a:solidFill>
-                <a:srgbClr val="FF0000"/>
-              </a:solidFill>
-              <a:prstDash val="solid"/>
-              <a:round/>
-              <a:headEnd type="none" w="med" len="med"/>
-              <a:tailEnd type="none" w="med" len="med"/>
-            </a:ln>
-            <a:effectLst/>
-          </p:spPr>
-        </p:cxnSp>
-        <p:cxnSp>
-          <p:nvCxnSpPr>
-            <p:cNvPr id="7" name="Straight Connector 6"/>
-            <p:cNvCxnSpPr/>
-            <p:nvPr/>
-          </p:nvCxnSpPr>
-          <p:spPr bwMode="auto">
-            <a:xfrm>
-              <a:off x="3600063" y="2773690"/>
-              <a:ext cx="1844039" cy="0"/>
-            </a:xfrm>
-            <a:prstGeom prst="line">
-              <a:avLst/>
-            </a:prstGeom>
-            <a:solidFill>
-              <a:srgbClr val="FFFFCC"/>
-            </a:solidFill>
-            <a:ln w="76200" cap="flat" cmpd="sng" algn="ctr">
-              <a:solidFill>
-                <a:srgbClr val="FF0000"/>
-              </a:solidFill>
-              <a:prstDash val="solid"/>
-              <a:round/>
-              <a:headEnd type="none" w="med" len="med"/>
-              <a:tailEnd type="none" w="med" len="med"/>
-            </a:ln>
-            <a:effectLst/>
-          </p:spPr>
-        </p:cxnSp>
-        <p:cxnSp>
-          <p:nvCxnSpPr>
-            <p:cNvPr id="8" name="Straight Connector 7"/>
-            <p:cNvCxnSpPr/>
-            <p:nvPr/>
-          </p:nvCxnSpPr>
-          <p:spPr bwMode="auto">
-            <a:xfrm>
-              <a:off x="3600063" y="3218190"/>
-              <a:ext cx="1844039" cy="0"/>
-            </a:xfrm>
-            <a:prstGeom prst="line">
-              <a:avLst/>
-            </a:prstGeom>
-            <a:solidFill>
-              <a:srgbClr val="FFFFCC"/>
-            </a:solidFill>
-            <a:ln w="76200" cap="flat" cmpd="sng" algn="ctr">
-              <a:solidFill>
-                <a:srgbClr val="FF0000"/>
-              </a:solidFill>
-              <a:prstDash val="solid"/>
-              <a:round/>
-              <a:headEnd type="none" w="med" len="med"/>
-              <a:tailEnd type="none" w="med" len="med"/>
-            </a:ln>
-            <a:effectLst/>
-          </p:spPr>
-        </p:cxnSp>
-        <p:cxnSp>
-          <p:nvCxnSpPr>
-            <p:cNvPr id="9" name="Straight Connector 8"/>
-            <p:cNvCxnSpPr/>
-            <p:nvPr/>
-          </p:nvCxnSpPr>
-          <p:spPr bwMode="auto">
-            <a:xfrm>
-              <a:off x="3630542" y="4996190"/>
-              <a:ext cx="1813560" cy="0"/>
-            </a:xfrm>
-            <a:prstGeom prst="line">
-              <a:avLst/>
-            </a:prstGeom>
-            <a:solidFill>
-              <a:srgbClr val="FFFFCC"/>
-            </a:solidFill>
-            <a:ln w="76200" cap="flat" cmpd="sng" algn="ctr">
-              <a:solidFill>
-                <a:srgbClr val="FF0000"/>
-              </a:solidFill>
-              <a:prstDash val="solid"/>
-              <a:round/>
-              <a:headEnd type="none" w="med" len="med"/>
-              <a:tailEnd type="none" w="med" len="med"/>
-            </a:ln>
-            <a:effectLst/>
-          </p:spPr>
-        </p:cxnSp>
-        <p:sp>
-          <p:nvSpPr>
-            <p:cNvPr id="10" name="TextBox 9"/>
-            <p:cNvSpPr txBox="1"/>
-            <p:nvPr/>
-          </p:nvSpPr>
-          <p:spPr bwMode="auto">
-            <a:xfrm rot="5400000">
-              <a:off x="4417108" y="3599607"/>
-              <a:ext cx="697627" cy="707886"/>
-            </a:xfrm>
-            <a:prstGeom prst="rect">
-              <a:avLst/>
-            </a:prstGeom>
-            <a:noFill/>
-            <a:ln w="76200">
-              <a:noFill/>
-              <a:miter lim="800000"/>
-              <a:headEnd/>
-              <a:tailEnd/>
-            </a:ln>
-            <a:effectLst>
-              <a:outerShdw blurRad="50800" dist="38100" dir="2700000" algn="tl" rotWithShape="0">
-                <a:prstClr val="black">
-                  <a:alpha val="40000"/>
-                </a:prstClr>
-              </a:outerShdw>
-            </a:effectLst>
-          </p:spPr>
-          <p:txBody>
-            <a:bodyPr wrap="none" rtlCol="0">
-              <a:spAutoFit/>
-            </a:bodyPr>
-            <a:lstStyle/>
-            <a:p>
-              <a:pPr algn="l"/>
-              <a:r>
-                <a:rPr lang="en-US" sz="4000" dirty="0">
-                  <a:solidFill>
-                    <a:srgbClr val="FF0000"/>
-                  </a:solidFill>
-                  <a:latin typeface="Arial" panose="020B0604020202020204" pitchFamily="34" charset="0"/>
-                  <a:cs typeface="Arial" panose="020B0604020202020204" pitchFamily="34" charset="0"/>
-                </a:rPr>
-                <a:t>…</a:t>
-              </a:r>
-            </a:p>
-          </p:txBody>
-        </p:sp>
-        <p:sp>
-          <p:nvSpPr>
-            <p:cNvPr id="17" name="Right Brace 16"/>
-            <p:cNvSpPr/>
-            <p:nvPr/>
-          </p:nvSpPr>
-          <p:spPr bwMode="auto">
-            <a:xfrm rot="5400000">
-              <a:off x="4198994" y="4838853"/>
-              <a:ext cx="716280" cy="1975835"/>
-            </a:xfrm>
-            <a:prstGeom prst="rightBrace">
-              <a:avLst/>
-            </a:prstGeom>
-            <a:noFill/>
-            <a:ln w="76200" cap="flat" cmpd="sng" algn="ctr">
-              <a:solidFill>
-                <a:srgbClr val="FFFF00"/>
-              </a:solidFill>
-              <a:prstDash val="solid"/>
-              <a:round/>
-              <a:headEnd type="none" w="med" len="med"/>
-              <a:tailEnd type="none" w="med" len="med"/>
-            </a:ln>
-            <a:effectLst/>
-          </p:spPr>
-          <p:txBody>
-            <a:bodyPr rtlCol="0" anchor="ctr"/>
-            <a:lstStyle/>
-            <a:p>
-              <a:pPr algn="ctr"/>
-              <a:endParaRPr lang="en-US" dirty="0"/>
-            </a:p>
-          </p:txBody>
-        </p:sp>
-        <p:sp>
-          <p:nvSpPr>
-            <p:cNvPr id="18" name="TextBox 17"/>
-            <p:cNvSpPr txBox="1"/>
-            <p:nvPr/>
-          </p:nvSpPr>
-          <p:spPr bwMode="auto">
-            <a:xfrm>
-              <a:off x="4035196" y="6197620"/>
-              <a:ext cx="1043876" cy="523220"/>
-            </a:xfrm>
-            <a:prstGeom prst="rect">
-              <a:avLst/>
-            </a:prstGeom>
-            <a:noFill/>
-            <a:ln w="76200">
-              <a:noFill/>
-              <a:miter lim="800000"/>
-              <a:headEnd/>
-              <a:tailEnd/>
-            </a:ln>
-            <a:effectLst>
-              <a:outerShdw blurRad="50800" dist="38100" dir="2700000" algn="tl" rotWithShape="0">
-                <a:prstClr val="black">
-                  <a:alpha val="40000"/>
-                </a:prstClr>
-              </a:outerShdw>
-            </a:effectLst>
-          </p:spPr>
-          <p:txBody>
-            <a:bodyPr wrap="none" rtlCol="0">
-              <a:spAutoFit/>
-            </a:bodyPr>
-            <a:lstStyle/>
-            <a:p>
-              <a:pPr algn="l"/>
-              <a:r>
-                <a:rPr lang="en-US" sz="2800" dirty="0">
-                  <a:solidFill>
-                    <a:srgbClr val="FFFF00"/>
-                  </a:solidFill>
-                  <a:latin typeface="Arial" panose="020B0604020202020204" pitchFamily="34" charset="0"/>
-                  <a:cs typeface="Arial" panose="020B0604020202020204" pitchFamily="34" charset="0"/>
-                </a:rPr>
-                <a:t>8 bits</a:t>
-              </a:r>
-            </a:p>
-          </p:txBody>
-        </p:sp>
-      </p:grpSp>
+              </a:rPr>
+              <a:t>8 bits</a:t>
+            </a:r>
+          </a:p>
+        </p:txBody>
+      </p:sp>
       <p:sp>
         <p:nvSpPr>
           <p:cNvPr id="24" name="Left Arrow 23"/>
@@ -37479,8 +37948,8 @@
         </p:nvSpPr>
         <p:spPr bwMode="auto">
           <a:xfrm>
-            <a:off x="777229" y="557162"/>
-            <a:ext cx="1383712" cy="523220"/>
+            <a:off x="777229" y="579074"/>
+            <a:ext cx="2244525" cy="523220"/>
           </a:xfrm>
           <a:prstGeom prst="rect">
             <a:avLst/>
@@ -37585,7 +38054,7 @@
                 <a:latin typeface="Arial" panose="020B0604020202020204" pitchFamily="34" charset="0"/>
                 <a:cs typeface="Arial" panose="020B0604020202020204" pitchFamily="34" charset="0"/>
               </a:rPr>
-              <a:t>Details:</a:t>
+              <a:t>Before 2021:</a:t>
             </a:r>
             <a:endParaRPr lang="en-US" sz="2800" i="1" dirty="0">
               <a:solidFill>
@@ -37704,7 +38173,7 @@
             <a:r>
               <a:rPr lang="en-US" sz="2800" dirty="0">
                 <a:solidFill>
-                  <a:srgbClr val="FFC000"/>
+                  <a:schemeClr val="tx1"/>
                 </a:solidFill>
                 <a:latin typeface="Arial" panose="020B0604020202020204" pitchFamily="34" charset="0"/>
                 <a:cs typeface="Arial" panose="020B0604020202020204" pitchFamily="34" charset="0"/>
@@ -37844,7 +38313,7 @@
             <a:r>
               <a:rPr lang="en-US" sz="2800" dirty="0">
                 <a:solidFill>
-                  <a:srgbClr val="FFC000"/>
+                  <a:schemeClr val="tx1"/>
                 </a:solidFill>
                 <a:latin typeface="Arial" panose="020B0604020202020204" pitchFamily="34" charset="0"/>
                 <a:cs typeface="Arial" panose="020B0604020202020204" pitchFamily="34" charset="0"/>
@@ -38111,7 +38580,7 @@
             <a:r>
               <a:rPr lang="en-US" sz="2800" dirty="0">
                 <a:solidFill>
-                  <a:srgbClr val="FFC000"/>
+                  <a:schemeClr val="tx1"/>
                 </a:solidFill>
                 <a:latin typeface="Arial" panose="020B0604020202020204" pitchFamily="34" charset="0"/>
                 <a:cs typeface="Arial" panose="020B0604020202020204" pitchFamily="34" charset="0"/>
@@ -38801,7 +39270,7 @@
         </p:nvSpPr>
         <p:spPr bwMode="auto">
           <a:xfrm>
-            <a:off x="1657927" y="3569316"/>
+            <a:off x="1343019" y="3539420"/>
             <a:ext cx="4064190" cy="523220"/>
           </a:xfrm>
           <a:prstGeom prst="rect">
@@ -38918,7 +39387,7 @@
         </p:nvSpPr>
         <p:spPr bwMode="auto">
           <a:xfrm>
-            <a:off x="501443" y="2678405"/>
+            <a:off x="501443" y="2688371"/>
             <a:ext cx="6162264" cy="523220"/>
           </a:xfrm>
           <a:prstGeom prst="rect">
@@ -39068,7 +39537,7 @@
         </p:nvSpPr>
         <p:spPr bwMode="auto">
           <a:xfrm>
-            <a:off x="1657927" y="4360571"/>
+            <a:off x="1343019" y="4390469"/>
             <a:ext cx="4820551" cy="523220"/>
           </a:xfrm>
           <a:prstGeom prst="rect">
@@ -39185,7 +39654,7 @@
         </p:nvSpPr>
         <p:spPr bwMode="auto">
           <a:xfrm>
-            <a:off x="501443" y="5201654"/>
+            <a:off x="501443" y="5241518"/>
             <a:ext cx="6423810" cy="523220"/>
           </a:xfrm>
           <a:prstGeom prst="rect">
@@ -39290,6 +39759,129 @@
                 <a:cs typeface="Arial" panose="020B0604020202020204" pitchFamily="34" charset="0"/>
               </a:rPr>
               <a:t>Tokens can be transferred, sold, traded</a:t>
+            </a:r>
+          </a:p>
+        </p:txBody>
+      </p:sp>
+      <p:sp>
+        <p:nvSpPr>
+          <p:cNvPr id="4" name="TextBox 3">
+            <a:extLst>
+              <a:ext uri="{FF2B5EF4-FFF2-40B4-BE49-F238E27FC236}">
+                <a16:creationId xmlns:a16="http://schemas.microsoft.com/office/drawing/2014/main" id="{51FA3EF1-0B7B-FB8C-F0F7-625465D4E595}"/>
+              </a:ext>
+            </a:extLst>
+          </p:cNvPr>
+          <p:cNvSpPr txBox="1"/>
+          <p:nvPr/>
+        </p:nvSpPr>
+        <p:spPr bwMode="auto">
+          <a:xfrm>
+            <a:off x="501443" y="6092565"/>
+            <a:ext cx="4823180" cy="523220"/>
+          </a:xfrm>
+          <a:prstGeom prst="rect">
+            <a:avLst/>
+          </a:prstGeom>
+          <a:solidFill>
+            <a:schemeClr val="bg1"/>
+          </a:solidFill>
+          <a:ln w="76200">
+            <a:solidFill>
+              <a:srgbClr val="00B0F0"/>
+            </a:solidFill>
+            <a:miter lim="800000"/>
+            <a:headEnd/>
+            <a:tailEnd/>
+          </a:ln>
+          <a:effectLst>
+            <a:outerShdw blurRad="50800" dist="38100" dir="2700000" algn="tl" rotWithShape="0">
+              <a:prstClr val="black">
+                <a:alpha val="40000"/>
+              </a:prstClr>
+            </a:outerShdw>
+          </a:effectLst>
+        </p:spPr>
+        <p:txBody>
+          <a:bodyPr wrap="none" rtlCol="0">
+            <a:spAutoFit/>
+          </a:bodyPr>
+          <a:lstStyle>
+            <a:lvl1pPr marL="0" indent="0">
+              <a:defRPr sz="1100">
+                <a:latin typeface="+mn-lt"/>
+                <a:ea typeface="+mn-ea"/>
+                <a:cs typeface="+mn-cs"/>
+              </a:defRPr>
+            </a:lvl1pPr>
+            <a:lvl2pPr marL="457200" indent="0">
+              <a:defRPr sz="1100">
+                <a:latin typeface="+mn-lt"/>
+                <a:ea typeface="+mn-ea"/>
+                <a:cs typeface="+mn-cs"/>
+              </a:defRPr>
+            </a:lvl2pPr>
+            <a:lvl3pPr marL="914400" indent="0">
+              <a:defRPr sz="1100">
+                <a:latin typeface="+mn-lt"/>
+                <a:ea typeface="+mn-ea"/>
+                <a:cs typeface="+mn-cs"/>
+              </a:defRPr>
+            </a:lvl3pPr>
+            <a:lvl4pPr marL="1371600" indent="0">
+              <a:defRPr sz="1100">
+                <a:latin typeface="+mn-lt"/>
+                <a:ea typeface="+mn-ea"/>
+                <a:cs typeface="+mn-cs"/>
+              </a:defRPr>
+            </a:lvl4pPr>
+            <a:lvl5pPr marL="1828800" indent="0">
+              <a:defRPr sz="1100">
+                <a:latin typeface="+mn-lt"/>
+                <a:ea typeface="+mn-ea"/>
+                <a:cs typeface="+mn-cs"/>
+              </a:defRPr>
+            </a:lvl5pPr>
+            <a:lvl6pPr marL="2286000" indent="0">
+              <a:defRPr sz="1100">
+                <a:latin typeface="+mn-lt"/>
+                <a:ea typeface="+mn-ea"/>
+                <a:cs typeface="+mn-cs"/>
+              </a:defRPr>
+            </a:lvl6pPr>
+            <a:lvl7pPr marL="2743200" indent="0">
+              <a:defRPr sz="1100">
+                <a:latin typeface="+mn-lt"/>
+                <a:ea typeface="+mn-ea"/>
+                <a:cs typeface="+mn-cs"/>
+              </a:defRPr>
+            </a:lvl7pPr>
+            <a:lvl8pPr marL="3200400" indent="0">
+              <a:defRPr sz="1100">
+                <a:latin typeface="+mn-lt"/>
+                <a:ea typeface="+mn-ea"/>
+                <a:cs typeface="+mn-cs"/>
+              </a:defRPr>
+            </a:lvl8pPr>
+            <a:lvl9pPr marL="3657600" indent="0">
+              <a:defRPr sz="1100">
+                <a:latin typeface="+mn-lt"/>
+                <a:ea typeface="+mn-ea"/>
+                <a:cs typeface="+mn-cs"/>
+              </a:defRPr>
+            </a:lvl9pPr>
+          </a:lstStyle>
+          <a:p>
+            <a:pPr algn="ctr"/>
+            <a:r>
+              <a:rPr lang="en-US" sz="2800" dirty="0">
+                <a:solidFill>
+                  <a:srgbClr val="FFFF00"/>
+                </a:solidFill>
+                <a:latin typeface="Arial" panose="020B0604020202020204" pitchFamily="34" charset="0"/>
+                <a:cs typeface="Arial" panose="020B0604020202020204" pitchFamily="34" charset="0"/>
+              </a:rPr>
+              <a:t>Obsolete now, but interesting</a:t>
             </a:r>
           </a:p>
         </p:txBody>
@@ -39537,6 +40129,51 @@
                       </p:childTnLst>
                     </p:cTn>
                   </p:par>
+                  <p:par>
+                    <p:cTn id="23" fill="hold">
+                      <p:stCondLst>
+                        <p:cond delay="indefinite"/>
+                      </p:stCondLst>
+                      <p:childTnLst>
+                        <p:par>
+                          <p:cTn id="24" fill="hold">
+                            <p:stCondLst>
+                              <p:cond delay="0"/>
+                            </p:stCondLst>
+                            <p:childTnLst>
+                              <p:par>
+                                <p:cTn id="25" presetID="1" presetClass="entr" presetSubtype="0" fill="hold" grpId="0" nodeType="clickEffect">
+                                  <p:stCondLst>
+                                    <p:cond delay="0"/>
+                                  </p:stCondLst>
+                                  <p:childTnLst>
+                                    <p:set>
+                                      <p:cBhvr>
+                                        <p:cTn id="26" dur="1" fill="hold">
+                                          <p:stCondLst>
+                                            <p:cond delay="0"/>
+                                          </p:stCondLst>
+                                        </p:cTn>
+                                        <p:tgtEl>
+                                          <p:spTgt spid="4"/>
+                                        </p:tgtEl>
+                                        <p:attrNameLst>
+                                          <p:attrName>style.visibility</p:attrName>
+                                        </p:attrNameLst>
+                                      </p:cBhvr>
+                                      <p:to>
+                                        <p:strVal val="visible"/>
+                                      </p:to>
+                                    </p:set>
+                                  </p:childTnLst>
+                                </p:cTn>
+                              </p:par>
+                            </p:childTnLst>
+                          </p:cTn>
+                        </p:par>
+                      </p:childTnLst>
+                    </p:cTn>
+                  </p:par>
                 </p:childTnLst>
               </p:cTn>
               <p:prevCondLst>
@@ -39564,6 +40201,7 @@
       <p:bldP spid="12" grpId="0" animBg="1"/>
       <p:bldP spid="13" grpId="0" animBg="1"/>
       <p:bldP spid="14" grpId="0" animBg="1"/>
+      <p:bldP spid="4" grpId="0" animBg="1"/>
     </p:bldLst>
   </p:timing>
 </p:sld>
@@ -40617,7 +41255,14 @@
           <a:bodyPr/>
           <a:lstStyle/>
           <a:p>
-            <a:endParaRPr lang="en-US" dirty="0"/>
+            <a:r>
+              <a:rPr lang="en-US" dirty="0">
+                <a:solidFill>
+                  <a:srgbClr val="FFFF00"/>
+                </a:solidFill>
+              </a:rPr>
+              <a:t>Was that a Good Thing?</a:t>
+            </a:r>
           </a:p>
         </p:txBody>
       </p:sp>
@@ -40645,145 +41290,6 @@
                 <a:defRPr/>
               </a:pPr>
               <a:t>63</a:t>
-            </a:fld>
-            <a:endParaRPr lang="en-US" dirty="0"/>
-          </a:p>
-        </p:txBody>
-      </p:sp>
-      <p:pic>
-        <p:nvPicPr>
-          <p:cNvPr id="5122" name="Picture 2"/>
-          <p:cNvPicPr>
-            <a:picLocks noChangeAspect="1" noChangeArrowheads="1"/>
-          </p:cNvPicPr>
-          <p:nvPr/>
-        </p:nvPicPr>
-        <p:blipFill>
-          <a:blip r:embed="rId2">
-            <a:extLst>
-              <a:ext uri="{28A0092B-C50C-407E-A947-70E740481C1C}">
-                <a14:useLocalDpi xmlns:a14="http://schemas.microsoft.com/office/drawing/2010/main" val="0"/>
-              </a:ext>
-            </a:extLst>
-          </a:blip>
-          <a:srcRect/>
-          <a:stretch>
-            <a:fillRect/>
-          </a:stretch>
-        </p:blipFill>
-        <p:spPr bwMode="auto">
-          <a:xfrm>
-            <a:off x="103722" y="49530"/>
-            <a:ext cx="8936556" cy="6758940"/>
-          </a:xfrm>
-          <a:prstGeom prst="rect">
-            <a:avLst/>
-          </a:prstGeom>
-          <a:noFill/>
-          <a:ln>
-            <a:noFill/>
-          </a:ln>
-          <a:extLst>
-            <a:ext uri="{909E8E84-426E-40DD-AFC4-6F175D3DCCD1}">
-              <a14:hiddenFill xmlns:a14="http://schemas.microsoft.com/office/drawing/2010/main">
-                <a:solidFill>
-                  <a:schemeClr val="accent1"/>
-                </a:solidFill>
-              </a14:hiddenFill>
-            </a:ext>
-            <a:ext uri="{91240B29-F687-4F45-9708-019B960494DF}">
-              <a14:hiddenLine xmlns:a14="http://schemas.microsoft.com/office/drawing/2010/main" w="9525">
-                <a:solidFill>
-                  <a:schemeClr val="tx1"/>
-                </a:solidFill>
-                <a:miter lim="800000"/>
-                <a:headEnd/>
-                <a:tailEnd/>
-              </a14:hiddenLine>
-            </a:ext>
-          </a:extLst>
-        </p:spPr>
-      </p:pic>
-    </p:spTree>
-    <p:extLst>
-      <p:ext uri="{BB962C8B-B14F-4D97-AF65-F5344CB8AC3E}">
-        <p14:creationId xmlns:p14="http://schemas.microsoft.com/office/powerpoint/2010/main" val="1311158056"/>
-      </p:ext>
-    </p:extLst>
-  </p:cSld>
-  <p:clrMapOvr>
-    <a:masterClrMapping/>
-  </p:clrMapOvr>
-</p:sld>
-</file>
-
-<file path=ppt/slides/slide64.xml><?xml version="1.0" encoding="utf-8"?>
-<p:sld xmlns:a="http://schemas.openxmlformats.org/drawingml/2006/main" xmlns:r="http://schemas.openxmlformats.org/officeDocument/2006/relationships" xmlns:p="http://schemas.openxmlformats.org/presentationml/2006/main">
-  <p:cSld>
-    <p:spTree>
-      <p:nvGrpSpPr>
-        <p:cNvPr id="1" name=""/>
-        <p:cNvGrpSpPr/>
-        <p:nvPr/>
-      </p:nvGrpSpPr>
-      <p:grpSpPr>
-        <a:xfrm>
-          <a:off x="0" y="0"/>
-          <a:ext cx="0" cy="0"/>
-          <a:chOff x="0" y="0"/>
-          <a:chExt cx="0" cy="0"/>
-        </a:xfrm>
-      </p:grpSpPr>
-      <p:sp>
-        <p:nvSpPr>
-          <p:cNvPr id="2" name="Title 1"/>
-          <p:cNvSpPr>
-            <a:spLocks noGrp="1"/>
-          </p:cNvSpPr>
-          <p:nvPr>
-            <p:ph type="title"/>
-          </p:nvPr>
-        </p:nvSpPr>
-        <p:spPr/>
-        <p:txBody>
-          <a:bodyPr/>
-          <a:lstStyle/>
-          <a:p>
-            <a:r>
-              <a:rPr lang="en-US" dirty="0">
-                <a:solidFill>
-                  <a:srgbClr val="FFFF00"/>
-                </a:solidFill>
-              </a:rPr>
-              <a:t>Is that a Good Thing?</a:t>
-            </a:r>
-          </a:p>
-        </p:txBody>
-      </p:sp>
-      <p:sp>
-        <p:nvSpPr>
-          <p:cNvPr id="3" name="Slide Number Placeholder 2"/>
-          <p:cNvSpPr>
-            <a:spLocks noGrp="1"/>
-          </p:cNvSpPr>
-          <p:nvPr>
-            <p:ph type="sldNum" sz="quarter" idx="11"/>
-          </p:nvPr>
-        </p:nvSpPr>
-        <p:spPr/>
-        <p:txBody>
-          <a:bodyPr/>
-          <a:lstStyle/>
-          <a:p>
-            <a:pPr>
-              <a:defRPr/>
-            </a:pPr>
-            <a:fld id="{D65C4E5D-DA99-460E-9E68-E8A28959880C}" type="slidenum">
-              <a:rPr lang="x-none" smtClean="0"/>
-              <a:pPr>
-                <a:defRPr/>
-              </a:pPr>
-              <a:t>64</a:t>
             </a:fld>
             <a:endParaRPr lang="en-US" dirty="0"/>
           </a:p>
@@ -41496,7 +42002,7 @@
 </p:sld>
 </file>
 
-<file path=ppt/slides/slide65.xml><?xml version="1.0" encoding="utf-8"?>
+<file path=ppt/slides/slide64.xml><?xml version="1.0" encoding="utf-8"?>
 <p:sld xmlns:a="http://schemas.openxmlformats.org/drawingml/2006/main" xmlns:r="http://schemas.openxmlformats.org/officeDocument/2006/relationships" xmlns:p="http://schemas.openxmlformats.org/presentationml/2006/main">
   <p:cSld>
     <p:spTree>
@@ -41562,7 +42068,7 @@
               <a:pPr>
                 <a:defRPr/>
               </a:pPr>
-              <a:t>65</a:t>
+              <a:t>64</a:t>
             </a:fld>
             <a:endParaRPr lang="en-US" dirty="0"/>
           </a:p>
@@ -41576,7 +42082,7 @@
         </p:nvSpPr>
         <p:spPr bwMode="auto">
           <a:xfrm>
-            <a:off x="1170460" y="3657752"/>
+            <a:off x="899554" y="3657752"/>
             <a:ext cx="6684843" cy="523220"/>
           </a:xfrm>
           <a:prstGeom prst="rect">
@@ -41693,7 +42199,7 @@
         </p:nvSpPr>
         <p:spPr bwMode="auto">
           <a:xfrm>
-            <a:off x="1170460" y="2693992"/>
+            <a:off x="899554" y="2693992"/>
             <a:ext cx="5243744" cy="523220"/>
           </a:xfrm>
           <a:prstGeom prst="rect">
@@ -41819,8 +42325,8 @@
         </p:nvSpPr>
         <p:spPr bwMode="auto">
           <a:xfrm>
-            <a:off x="1170460" y="4621511"/>
-            <a:ext cx="4936159" cy="523220"/>
+            <a:off x="899554" y="4621511"/>
+            <a:ext cx="5477974" cy="523220"/>
           </a:xfrm>
           <a:prstGeom prst="rect">
             <a:avLst/>
@@ -41923,7 +42429,7 @@
                 <a:latin typeface="Arial" panose="020B0604020202020204" pitchFamily="34" charset="0"/>
                 <a:cs typeface="Arial" panose="020B0604020202020204" pitchFamily="34" charset="0"/>
               </a:rPr>
-              <a:t>Gas Tokens no longer worth it</a:t>
+              <a:t>Gas Tokens no longer worthwhile</a:t>
             </a:r>
           </a:p>
         </p:txBody>
@@ -42111,7 +42617,7 @@
 </p:sld>
 </file>
 
-<file path=ppt/slides/slide66.xml><?xml version="1.0" encoding="utf-8"?>
+<file path=ppt/slides/slide65.xml><?xml version="1.0" encoding="utf-8"?>
 <p:sld xmlns:a="http://schemas.openxmlformats.org/drawingml/2006/main" xmlns:r="http://schemas.openxmlformats.org/officeDocument/2006/relationships" xmlns:p="http://schemas.openxmlformats.org/presentationml/2006/main">
   <p:cSld>
     <p:spTree>
@@ -42203,7 +42709,7 @@
                   <a:srgbClr val="FFFF00"/>
                 </a:solidFill>
               </a:rPr>
-              <a:t>Proposal for Rent</a:t>
+              <a:t>The Problem with Storage</a:t>
             </a:r>
           </a:p>
         </p:txBody>
@@ -42231,7 +42737,7 @@
               <a:pPr>
                 <a:defRPr/>
               </a:pPr>
-              <a:t>66</a:t>
+              <a:t>65</a:t>
             </a:fld>
             <a:endParaRPr lang="en-US" dirty="0"/>
           </a:p>
@@ -42245,7 +42751,7 @@
         </p:nvSpPr>
         <p:spPr bwMode="auto">
           <a:xfrm>
-            <a:off x="961495" y="1837322"/>
+            <a:off x="1612758" y="1981965"/>
             <a:ext cx="3023585" cy="523220"/>
           </a:xfrm>
           <a:prstGeom prst="rect">
@@ -42369,7 +42875,7 @@
         </p:nvSpPr>
         <p:spPr bwMode="auto">
           <a:xfrm>
-            <a:off x="961495" y="4179888"/>
+            <a:off x="1612758" y="4324531"/>
             <a:ext cx="3180679" cy="523220"/>
           </a:xfrm>
           <a:prstGeom prst="rect">
@@ -42486,7 +42992,7 @@
         </p:nvSpPr>
         <p:spPr bwMode="auto">
           <a:xfrm>
-            <a:off x="961495" y="3008605"/>
+            <a:off x="1612758" y="3153248"/>
             <a:ext cx="4735592" cy="523220"/>
           </a:xfrm>
           <a:prstGeom prst="rect">
@@ -42606,7 +43112,7 @@
         </p:nvSpPr>
         <p:spPr bwMode="auto">
           <a:xfrm>
-            <a:off x="961495" y="5351171"/>
+            <a:off x="1612758" y="5495814"/>
             <a:ext cx="4762843" cy="523220"/>
           </a:xfrm>
           <a:prstGeom prst="rect">
@@ -42944,7 +43450,7 @@
 </p:sld>
 </file>
 
-<file path=ppt/slides/slide67.xml><?xml version="1.0" encoding="utf-8"?>
+<file path=ppt/slides/slide66.xml><?xml version="1.0" encoding="utf-8"?>
 <p:sld xmlns:a="http://schemas.openxmlformats.org/drawingml/2006/main" xmlns:r="http://schemas.openxmlformats.org/officeDocument/2006/relationships" xmlns:p="http://schemas.openxmlformats.org/presentationml/2006/main">
   <p:cSld>
     <p:spTree>
@@ -43036,7 +43542,7 @@
                   <a:srgbClr val="FFFF00"/>
                 </a:solidFill>
               </a:rPr>
-              <a:t>Proposal for Rent</a:t>
+              <a:t>Blobs</a:t>
             </a:r>
           </a:p>
         </p:txBody>
@@ -43064,7 +43570,7 @@
               <a:pPr>
                 <a:defRPr/>
               </a:pPr>
-              <a:t>67</a:t>
+              <a:t>66</a:t>
             </a:fld>
             <a:endParaRPr lang="en-US" dirty="0"/>
           </a:p>
@@ -43078,8 +43584,8 @@
         </p:nvSpPr>
         <p:spPr bwMode="auto">
           <a:xfrm>
-            <a:off x="1011139" y="1837322"/>
-            <a:ext cx="2401619" cy="523220"/>
+            <a:off x="1142018" y="1925919"/>
+            <a:ext cx="3544560" cy="523220"/>
           </a:xfrm>
           <a:prstGeom prst="rect">
             <a:avLst/>
@@ -43182,7 +43688,7 @@
                 <a:latin typeface="Arial" panose="020B0604020202020204" pitchFamily="34" charset="0"/>
                 <a:cs typeface="Arial" panose="020B0604020202020204" pitchFamily="34" charset="0"/>
               </a:rPr>
-              <a:t>Keep track of:</a:t>
+              <a:t>Large chunks of data</a:t>
             </a:r>
             <a:endParaRPr lang="en-US" sz="2800" i="1" dirty="0">
               <a:solidFill>
@@ -43202,8 +43708,8 @@
         </p:nvSpPr>
         <p:spPr bwMode="auto">
           <a:xfrm>
-            <a:off x="1011139" y="3650294"/>
-            <a:ext cx="5428089" cy="523220"/>
+            <a:off x="1142018" y="3738891"/>
+            <a:ext cx="5904180" cy="523220"/>
           </a:xfrm>
           <a:prstGeom prst="rect">
             <a:avLst/>
@@ -43306,18 +43812,15 @@
                 <a:latin typeface="Arial" panose="020B0604020202020204" pitchFamily="34" charset="0"/>
                 <a:cs typeface="Arial" panose="020B0604020202020204" pitchFamily="34" charset="0"/>
               </a:rPr>
-              <a:t>Size in bytes: </a:t>
+              <a:t>Useful for short-lived apps (Layer 2)</a:t>
             </a:r>
-            <a:r>
-              <a:rPr lang="en-US" sz="2800" b="1" dirty="0">
-                <a:solidFill>
-                  <a:schemeClr val="tx1"/>
-                </a:solidFill>
-                <a:latin typeface="Courier New" panose="02070309020205020404" pitchFamily="49" charset="0"/>
-                <a:cs typeface="Courier New" panose="02070309020205020404" pitchFamily="49" charset="0"/>
-              </a:rPr>
-              <a:t>storage_bytes </a:t>
-            </a:r>
+            <a:endParaRPr lang="en-US" sz="2800" b="1" dirty="0">
+              <a:solidFill>
+                <a:schemeClr val="tx1"/>
+              </a:solidFill>
+              <a:latin typeface="Courier New" panose="02070309020205020404" pitchFamily="49" charset="0"/>
+              <a:cs typeface="Courier New" panose="02070309020205020404" pitchFamily="49" charset="0"/>
+            </a:endParaRPr>
           </a:p>
         </p:txBody>
       </p:sp>
@@ -43329,8 +43832,8 @@
         </p:nvSpPr>
         <p:spPr bwMode="auto">
           <a:xfrm>
-            <a:off x="1011139" y="2743808"/>
-            <a:ext cx="7212231" cy="523220"/>
+            <a:off x="1142018" y="2832405"/>
+            <a:ext cx="4614020" cy="523220"/>
           </a:xfrm>
           <a:prstGeom prst="rect">
             <a:avLst/>
@@ -43436,18 +43939,15 @@
                 <a:latin typeface="Arial" panose="020B0604020202020204" pitchFamily="34" charset="0"/>
                 <a:cs typeface="Arial" panose="020B0604020202020204" pitchFamily="34" charset="0"/>
               </a:rPr>
-              <a:t>Last block to access data: </a:t>
+              <a:t>Temporary: ~18 day lifetime</a:t>
             </a:r>
-            <a:r>
-              <a:rPr lang="en-US" sz="2800" b="1" dirty="0">
-                <a:solidFill>
-                  <a:schemeClr val="tx1"/>
-                </a:solidFill>
-                <a:latin typeface="Courier New" panose="02070309020205020404" pitchFamily="49" charset="0"/>
-                <a:cs typeface="Courier New" panose="02070309020205020404" pitchFamily="49" charset="0"/>
-              </a:rPr>
-              <a:t>last_accessed</a:t>
-            </a:r>
+            <a:endParaRPr lang="en-US" sz="2800" b="1" dirty="0">
+              <a:solidFill>
+                <a:schemeClr val="tx1"/>
+              </a:solidFill>
+              <a:latin typeface="Courier New" panose="02070309020205020404" pitchFamily="49" charset="0"/>
+              <a:cs typeface="Courier New" panose="02070309020205020404" pitchFamily="49" charset="0"/>
+            </a:endParaRPr>
           </a:p>
         </p:txBody>
       </p:sp>
@@ -43459,8 +43959,8 @@
         </p:nvSpPr>
         <p:spPr bwMode="auto">
           <a:xfrm>
-            <a:off x="1011139" y="4556780"/>
-            <a:ext cx="4261103" cy="523220"/>
+            <a:off x="1142018" y="4645377"/>
+            <a:ext cx="3666388" cy="523220"/>
           </a:xfrm>
           <a:prstGeom prst="rect">
             <a:avLst/>
@@ -43563,7 +44063,7 @@
                 <a:latin typeface="Arial" panose="020B0604020202020204" pitchFamily="34" charset="0"/>
                 <a:cs typeface="Arial" panose="020B0604020202020204" pitchFamily="34" charset="0"/>
               </a:rPr>
-              <a:t>On store, extra charge of:</a:t>
+              <a:t>Cheaper than storage</a:t>
             </a:r>
           </a:p>
         </p:txBody>
@@ -43576,8 +44076,8 @@
         </p:nvSpPr>
         <p:spPr bwMode="auto">
           <a:xfrm>
-            <a:off x="1011139" y="5463264"/>
-            <a:ext cx="7032694" cy="954107"/>
+            <a:off x="1142018" y="5551861"/>
+            <a:ext cx="6680035" cy="523220"/>
           </a:xfrm>
           <a:prstGeom prst="rect">
             <a:avLst/>
@@ -43690,30 +44190,17 @@
                 <a:latin typeface="Arial" panose="020B0604020202020204" pitchFamily="34" charset="0"/>
                 <a:cs typeface="Arial" panose="020B0604020202020204" pitchFamily="34" charset="0"/>
               </a:rPr>
-              <a:t>O((</a:t>
+              <a:t>Part of “Proto-</a:t>
             </a:r>
             <a:r>
-              <a:rPr lang="en-US" sz="2800" b="1" dirty="0">
+              <a:rPr lang="en-US" sz="2800" dirty="0" err="1">
                 <a:solidFill>
                   <a:schemeClr val="tx1"/>
                 </a:solidFill>
-                <a:latin typeface="Courier New" panose="02070309020205020404" pitchFamily="49" charset="0"/>
-                <a:cs typeface="Courier New" panose="02070309020205020404" pitchFamily="49" charset="0"/>
+                <a:latin typeface="Arial" panose="020B0604020202020204" pitchFamily="34" charset="0"/>
+                <a:cs typeface="Arial" panose="020B0604020202020204" pitchFamily="34" charset="0"/>
               </a:rPr>
-              <a:t>block.number – last_accessed)</a:t>
-            </a:r>
-          </a:p>
-          <a:p>
-            <a:pPr algn="ctr"/>
-            <a:r>
-              <a:rPr lang="en-US" sz="2800" b="1" dirty="0">
-                <a:solidFill>
-                  <a:schemeClr val="tx1"/>
-                </a:solidFill>
-                <a:latin typeface="Courier New" panose="02070309020205020404" pitchFamily="49" charset="0"/>
-                <a:cs typeface="Courier New" panose="02070309020205020404" pitchFamily="49" charset="0"/>
-              </a:rPr>
-              <a:t> * storage_bytes</a:t>
+              <a:t>Danksharding</a:t>
             </a:r>
             <a:r>
               <a:rPr lang="en-US" sz="2800" dirty="0">
@@ -43723,7 +44210,7 @@
                 <a:latin typeface="Arial" panose="020B0604020202020204" pitchFamily="34" charset="0"/>
                 <a:cs typeface="Arial" panose="020B0604020202020204" pitchFamily="34" charset="0"/>
               </a:rPr>
-              <a:t>)</a:t>
+              <a:t>” initiative …</a:t>
             </a:r>
           </a:p>
         </p:txBody>
@@ -44003,854 +44490,7 @@
 </p:sld>
 </file>
 
-<file path=ppt/slides/slide68.xml><?xml version="1.0" encoding="utf-8"?>
-<p:sld xmlns:a="http://schemas.openxmlformats.org/drawingml/2006/main" xmlns:r="http://schemas.openxmlformats.org/officeDocument/2006/relationships" xmlns:p="http://schemas.openxmlformats.org/presentationml/2006/main">
-  <p:cSld>
-    <p:spTree>
-      <p:nvGrpSpPr>
-        <p:cNvPr id="1" name=""/>
-        <p:cNvGrpSpPr/>
-        <p:nvPr/>
-      </p:nvGrpSpPr>
-      <p:grpSpPr>
-        <a:xfrm>
-          <a:off x="0" y="0"/>
-          <a:ext cx="0" cy="0"/>
-          <a:chOff x="0" y="0"/>
-          <a:chExt cx="0" cy="0"/>
-        </a:xfrm>
-      </p:grpSpPr>
-      <p:pic>
-        <p:nvPicPr>
-          <p:cNvPr id="13" name="Picture 2" descr="Image result for for rent sign"/>
-          <p:cNvPicPr>
-            <a:picLocks noChangeAspect="1" noChangeArrowheads="1"/>
-          </p:cNvPicPr>
-          <p:nvPr/>
-        </p:nvPicPr>
-        <p:blipFill>
-          <a:blip r:embed="rId2">
-            <a:extLst>
-              <a:ext uri="{BEBA8EAE-BF5A-486C-A8C5-ECC9F3942E4B}">
-                <a14:imgProps xmlns:a14="http://schemas.microsoft.com/office/drawing/2010/main">
-                  <a14:imgLayer r:embed="rId3">
-                    <a14:imgEffect>
-                      <a14:artisticPencilSketch/>
-                    </a14:imgEffect>
-                  </a14:imgLayer>
-                </a14:imgProps>
-              </a:ext>
-              <a:ext uri="{28A0092B-C50C-407E-A947-70E740481C1C}">
-                <a14:useLocalDpi xmlns:a14="http://schemas.microsoft.com/office/drawing/2010/main" val="0"/>
-              </a:ext>
-            </a:extLst>
-          </a:blip>
-          <a:srcRect/>
-          <a:stretch>
-            <a:fillRect/>
-          </a:stretch>
-        </p:blipFill>
-        <p:spPr bwMode="auto">
-          <a:xfrm>
-            <a:off x="-190500" y="-1333500"/>
-            <a:ext cx="9525000" cy="9525000"/>
-          </a:xfrm>
-          <a:prstGeom prst="rect">
-            <a:avLst/>
-          </a:prstGeom>
-          <a:noFill/>
-          <a:extLst>
-            <a:ext uri="{909E8E84-426E-40DD-AFC4-6F175D3DCCD1}">
-              <a14:hiddenFill xmlns:a14="http://schemas.microsoft.com/office/drawing/2010/main">
-                <a:solidFill>
-                  <a:srgbClr val="FFFFFF"/>
-                </a:solidFill>
-              </a14:hiddenFill>
-            </a:ext>
-          </a:extLst>
-        </p:spPr>
-      </p:pic>
-      <p:sp>
-        <p:nvSpPr>
-          <p:cNvPr id="2" name="Title 1"/>
-          <p:cNvSpPr>
-            <a:spLocks noGrp="1"/>
-          </p:cNvSpPr>
-          <p:nvPr>
-            <p:ph type="title"/>
-          </p:nvPr>
-        </p:nvSpPr>
-        <p:spPr>
-          <a:solidFill>
-            <a:schemeClr val="bg1"/>
-          </a:solidFill>
-        </p:spPr>
-        <p:txBody>
-          <a:bodyPr/>
-          <a:lstStyle/>
-          <a:p>
-            <a:r>
-              <a:rPr lang="en-US" dirty="0">
-                <a:solidFill>
-                  <a:srgbClr val="FFFF00"/>
-                </a:solidFill>
-              </a:rPr>
-              <a:t>Proposal for Rent</a:t>
-            </a:r>
-          </a:p>
-        </p:txBody>
-      </p:sp>
-      <p:sp>
-        <p:nvSpPr>
-          <p:cNvPr id="3" name="Slide Number Placeholder 2"/>
-          <p:cNvSpPr>
-            <a:spLocks noGrp="1"/>
-          </p:cNvSpPr>
-          <p:nvPr>
-            <p:ph type="sldNum" sz="quarter" idx="11"/>
-          </p:nvPr>
-        </p:nvSpPr>
-        <p:spPr/>
-        <p:txBody>
-          <a:bodyPr/>
-          <a:lstStyle/>
-          <a:p>
-            <a:pPr>
-              <a:defRPr/>
-            </a:pPr>
-            <a:fld id="{D65C4E5D-DA99-460E-9E68-E8A28959880C}" type="slidenum">
-              <a:rPr lang="x-none" smtClean="0"/>
-              <a:pPr>
-                <a:defRPr/>
-              </a:pPr>
-              <a:t>68</a:t>
-            </a:fld>
-            <a:endParaRPr lang="en-US" dirty="0"/>
-          </a:p>
-        </p:txBody>
-      </p:sp>
-      <p:sp>
-        <p:nvSpPr>
-          <p:cNvPr id="9" name="TextBox 8"/>
-          <p:cNvSpPr txBox="1"/>
-          <p:nvPr/>
-        </p:nvSpPr>
-        <p:spPr bwMode="auto">
-          <a:xfrm>
-            <a:off x="988381" y="1837322"/>
-            <a:ext cx="4942379" cy="523220"/>
-          </a:xfrm>
-          <a:prstGeom prst="rect">
-            <a:avLst/>
-          </a:prstGeom>
-          <a:solidFill>
-            <a:schemeClr val="bg1"/>
-          </a:solidFill>
-          <a:ln w="76200">
-            <a:solidFill>
-              <a:srgbClr val="FF0000"/>
-            </a:solidFill>
-            <a:miter lim="800000"/>
-            <a:headEnd/>
-            <a:tailEnd/>
-          </a:ln>
-          <a:effectLst>
-            <a:outerShdw blurRad="50800" dist="38100" dir="2700000" algn="tl" rotWithShape="0">
-              <a:prstClr val="black">
-                <a:alpha val="40000"/>
-              </a:prstClr>
-            </a:outerShdw>
-          </a:effectLst>
-        </p:spPr>
-        <p:txBody>
-          <a:bodyPr wrap="none" rtlCol="0">
-            <a:spAutoFit/>
-          </a:bodyPr>
-          <a:lstStyle>
-            <a:lvl1pPr marL="0" indent="0">
-              <a:defRPr sz="1100">
-                <a:latin typeface="+mn-lt"/>
-                <a:ea typeface="+mn-ea"/>
-                <a:cs typeface="+mn-cs"/>
-              </a:defRPr>
-            </a:lvl1pPr>
-            <a:lvl2pPr marL="457200" indent="0">
-              <a:defRPr sz="1100">
-                <a:latin typeface="+mn-lt"/>
-                <a:ea typeface="+mn-ea"/>
-                <a:cs typeface="+mn-cs"/>
-              </a:defRPr>
-            </a:lvl2pPr>
-            <a:lvl3pPr marL="914400" indent="0">
-              <a:defRPr sz="1100">
-                <a:latin typeface="+mn-lt"/>
-                <a:ea typeface="+mn-ea"/>
-                <a:cs typeface="+mn-cs"/>
-              </a:defRPr>
-            </a:lvl3pPr>
-            <a:lvl4pPr marL="1371600" indent="0">
-              <a:defRPr sz="1100">
-                <a:latin typeface="+mn-lt"/>
-                <a:ea typeface="+mn-ea"/>
-                <a:cs typeface="+mn-cs"/>
-              </a:defRPr>
-            </a:lvl4pPr>
-            <a:lvl5pPr marL="1828800" indent="0">
-              <a:defRPr sz="1100">
-                <a:latin typeface="+mn-lt"/>
-                <a:ea typeface="+mn-ea"/>
-                <a:cs typeface="+mn-cs"/>
-              </a:defRPr>
-            </a:lvl5pPr>
-            <a:lvl6pPr marL="2286000" indent="0">
-              <a:defRPr sz="1100">
-                <a:latin typeface="+mn-lt"/>
-                <a:ea typeface="+mn-ea"/>
-                <a:cs typeface="+mn-cs"/>
-              </a:defRPr>
-            </a:lvl6pPr>
-            <a:lvl7pPr marL="2743200" indent="0">
-              <a:defRPr sz="1100">
-                <a:latin typeface="+mn-lt"/>
-                <a:ea typeface="+mn-ea"/>
-                <a:cs typeface="+mn-cs"/>
-              </a:defRPr>
-            </a:lvl7pPr>
-            <a:lvl8pPr marL="3200400" indent="0">
-              <a:defRPr sz="1100">
-                <a:latin typeface="+mn-lt"/>
-                <a:ea typeface="+mn-ea"/>
-                <a:cs typeface="+mn-cs"/>
-              </a:defRPr>
-            </a:lvl8pPr>
-            <a:lvl9pPr marL="3657600" indent="0">
-              <a:defRPr sz="1100">
-                <a:latin typeface="+mn-lt"/>
-                <a:ea typeface="+mn-ea"/>
-                <a:cs typeface="+mn-cs"/>
-              </a:defRPr>
-            </a:lvl9pPr>
-          </a:lstStyle>
-          <a:p>
-            <a:pPr algn="ctr"/>
-            <a:r>
-              <a:rPr lang="en-US" sz="2800" dirty="0">
-                <a:solidFill>
-                  <a:srgbClr val="FFFF00"/>
-                </a:solidFill>
-                <a:latin typeface="Arial" panose="020B0604020202020204" pitchFamily="34" charset="0"/>
-                <a:cs typeface="Arial" panose="020B0604020202020204" pitchFamily="34" charset="0"/>
-              </a:rPr>
-              <a:t>Why would anyone want this?</a:t>
-            </a:r>
-            <a:endParaRPr lang="en-US" sz="2800" i="1" dirty="0">
-              <a:solidFill>
-                <a:srgbClr val="FFFF00"/>
-              </a:solidFill>
-              <a:latin typeface="Arial" panose="020B0604020202020204" pitchFamily="34" charset="0"/>
-              <a:cs typeface="Arial" panose="020B0604020202020204" pitchFamily="34" charset="0"/>
-            </a:endParaRPr>
-          </a:p>
-        </p:txBody>
-      </p:sp>
-      <p:sp>
-        <p:nvSpPr>
-          <p:cNvPr id="10" name="TextBox 9"/>
-          <p:cNvSpPr txBox="1"/>
-          <p:nvPr/>
-        </p:nvSpPr>
-        <p:spPr bwMode="auto">
-          <a:xfrm>
-            <a:off x="988381" y="4142737"/>
-            <a:ext cx="6462026" cy="523220"/>
-          </a:xfrm>
-          <a:prstGeom prst="rect">
-            <a:avLst/>
-          </a:prstGeom>
-          <a:solidFill>
-            <a:schemeClr val="bg1"/>
-          </a:solidFill>
-          <a:ln w="76200">
-            <a:solidFill>
-              <a:srgbClr val="FFC000"/>
-            </a:solidFill>
-            <a:miter lim="800000"/>
-            <a:headEnd/>
-            <a:tailEnd/>
-          </a:ln>
-          <a:effectLst>
-            <a:outerShdw blurRad="50800" dist="38100" dir="2700000" algn="tl" rotWithShape="0">
-              <a:prstClr val="black">
-                <a:alpha val="40000"/>
-              </a:prstClr>
-            </a:outerShdw>
-          </a:effectLst>
-        </p:spPr>
-        <p:txBody>
-          <a:bodyPr wrap="none" rtlCol="0">
-            <a:spAutoFit/>
-          </a:bodyPr>
-          <a:lstStyle>
-            <a:lvl1pPr marL="0" indent="0">
-              <a:defRPr sz="1100">
-                <a:latin typeface="+mn-lt"/>
-                <a:ea typeface="+mn-ea"/>
-                <a:cs typeface="+mn-cs"/>
-              </a:defRPr>
-            </a:lvl1pPr>
-            <a:lvl2pPr marL="457200" indent="0">
-              <a:defRPr sz="1100">
-                <a:latin typeface="+mn-lt"/>
-                <a:ea typeface="+mn-ea"/>
-                <a:cs typeface="+mn-cs"/>
-              </a:defRPr>
-            </a:lvl2pPr>
-            <a:lvl3pPr marL="914400" indent="0">
-              <a:defRPr sz="1100">
-                <a:latin typeface="+mn-lt"/>
-                <a:ea typeface="+mn-ea"/>
-                <a:cs typeface="+mn-cs"/>
-              </a:defRPr>
-            </a:lvl3pPr>
-            <a:lvl4pPr marL="1371600" indent="0">
-              <a:defRPr sz="1100">
-                <a:latin typeface="+mn-lt"/>
-                <a:ea typeface="+mn-ea"/>
-                <a:cs typeface="+mn-cs"/>
-              </a:defRPr>
-            </a:lvl4pPr>
-            <a:lvl5pPr marL="1828800" indent="0">
-              <a:defRPr sz="1100">
-                <a:latin typeface="+mn-lt"/>
-                <a:ea typeface="+mn-ea"/>
-                <a:cs typeface="+mn-cs"/>
-              </a:defRPr>
-            </a:lvl5pPr>
-            <a:lvl6pPr marL="2286000" indent="0">
-              <a:defRPr sz="1100">
-                <a:latin typeface="+mn-lt"/>
-                <a:ea typeface="+mn-ea"/>
-                <a:cs typeface="+mn-cs"/>
-              </a:defRPr>
-            </a:lvl6pPr>
-            <a:lvl7pPr marL="2743200" indent="0">
-              <a:defRPr sz="1100">
-                <a:latin typeface="+mn-lt"/>
-                <a:ea typeface="+mn-ea"/>
-                <a:cs typeface="+mn-cs"/>
-              </a:defRPr>
-            </a:lvl7pPr>
-            <a:lvl8pPr marL="3200400" indent="0">
-              <a:defRPr sz="1100">
-                <a:latin typeface="+mn-lt"/>
-                <a:ea typeface="+mn-ea"/>
-                <a:cs typeface="+mn-cs"/>
-              </a:defRPr>
-            </a:lvl8pPr>
-            <a:lvl9pPr marL="3657600" indent="0">
-              <a:defRPr sz="1100">
-                <a:latin typeface="+mn-lt"/>
-                <a:ea typeface="+mn-ea"/>
-                <a:cs typeface="+mn-cs"/>
-              </a:defRPr>
-            </a:lvl9pPr>
-          </a:lstStyle>
-          <a:p>
-            <a:pPr algn="ctr"/>
-            <a:r>
-              <a:rPr lang="en-US" sz="2800" dirty="0">
-                <a:solidFill>
-                  <a:srgbClr val="FFFF00"/>
-                </a:solidFill>
-                <a:latin typeface="Arial" panose="020B0604020202020204" pitchFamily="34" charset="0"/>
-                <a:cs typeface="Arial" panose="020B0604020202020204" pitchFamily="34" charset="0"/>
-              </a:rPr>
-              <a:t>Disk space for a full node may go down</a:t>
-            </a:r>
-            <a:endParaRPr lang="en-US" sz="2800" b="1" dirty="0">
-              <a:solidFill>
-                <a:srgbClr val="FFC000"/>
-              </a:solidFill>
-              <a:latin typeface="Courier New" panose="02070309020205020404" pitchFamily="49" charset="0"/>
-              <a:cs typeface="Courier New" panose="02070309020205020404" pitchFamily="49" charset="0"/>
-            </a:endParaRPr>
-          </a:p>
-        </p:txBody>
-      </p:sp>
-      <p:sp>
-        <p:nvSpPr>
-          <p:cNvPr id="11" name="TextBox 3"/>
-          <p:cNvSpPr txBox="1"/>
-          <p:nvPr/>
-        </p:nvSpPr>
-        <p:spPr bwMode="auto">
-          <a:xfrm>
-            <a:off x="988381" y="2774586"/>
-            <a:ext cx="5873446" cy="954107"/>
-          </a:xfrm>
-          <a:prstGeom prst="rect">
-            <a:avLst/>
-          </a:prstGeom>
-          <a:solidFill>
-            <a:schemeClr val="bg1"/>
-          </a:solidFill>
-          <a:ln w="76200">
-            <a:solidFill>
-              <a:schemeClr val="accent2">
-                <a:lumMod val="40000"/>
-                <a:lumOff val="60000"/>
-              </a:schemeClr>
-            </a:solidFill>
-            <a:miter lim="800000"/>
-            <a:headEnd/>
-            <a:tailEnd/>
-          </a:ln>
-          <a:effectLst>
-            <a:outerShdw blurRad="50800" dist="38100" dir="2700000" algn="tl" rotWithShape="0">
-              <a:prstClr val="black">
-                <a:alpha val="40000"/>
-              </a:prstClr>
-            </a:outerShdw>
-          </a:effectLst>
-        </p:spPr>
-        <p:txBody>
-          <a:bodyPr wrap="square" rtlCol="0">
-            <a:spAutoFit/>
-          </a:bodyPr>
-          <a:lstStyle>
-            <a:lvl1pPr marL="0" indent="0">
-              <a:defRPr sz="1100">
-                <a:latin typeface="+mn-lt"/>
-                <a:ea typeface="+mn-ea"/>
-                <a:cs typeface="+mn-cs"/>
-              </a:defRPr>
-            </a:lvl1pPr>
-            <a:lvl2pPr marL="457200" indent="0">
-              <a:defRPr sz="1100">
-                <a:latin typeface="+mn-lt"/>
-                <a:ea typeface="+mn-ea"/>
-                <a:cs typeface="+mn-cs"/>
-              </a:defRPr>
-            </a:lvl2pPr>
-            <a:lvl3pPr marL="914400" indent="0">
-              <a:defRPr sz="1100">
-                <a:latin typeface="+mn-lt"/>
-                <a:ea typeface="+mn-ea"/>
-                <a:cs typeface="+mn-cs"/>
-              </a:defRPr>
-            </a:lvl3pPr>
-            <a:lvl4pPr marL="1371600" indent="0">
-              <a:defRPr sz="1100">
-                <a:latin typeface="+mn-lt"/>
-                <a:ea typeface="+mn-ea"/>
-                <a:cs typeface="+mn-cs"/>
-              </a:defRPr>
-            </a:lvl4pPr>
-            <a:lvl5pPr marL="1828800" indent="0">
-              <a:defRPr sz="1100">
-                <a:latin typeface="+mn-lt"/>
-                <a:ea typeface="+mn-ea"/>
-                <a:cs typeface="+mn-cs"/>
-              </a:defRPr>
-            </a:lvl5pPr>
-            <a:lvl6pPr marL="2286000" indent="0">
-              <a:defRPr sz="1100">
-                <a:latin typeface="+mn-lt"/>
-                <a:ea typeface="+mn-ea"/>
-                <a:cs typeface="+mn-cs"/>
-              </a:defRPr>
-            </a:lvl6pPr>
-            <a:lvl7pPr marL="2743200" indent="0">
-              <a:defRPr sz="1100">
-                <a:latin typeface="+mn-lt"/>
-                <a:ea typeface="+mn-ea"/>
-                <a:cs typeface="+mn-cs"/>
-              </a:defRPr>
-            </a:lvl7pPr>
-            <a:lvl8pPr marL="3200400" indent="0">
-              <a:defRPr sz="1100">
-                <a:latin typeface="+mn-lt"/>
-                <a:ea typeface="+mn-ea"/>
-                <a:cs typeface="+mn-cs"/>
-              </a:defRPr>
-            </a:lvl8pPr>
-            <a:lvl9pPr marL="3657600" indent="0">
-              <a:defRPr sz="1100">
-                <a:latin typeface="+mn-lt"/>
-                <a:ea typeface="+mn-ea"/>
-                <a:cs typeface="+mn-cs"/>
-              </a:defRPr>
-            </a:lvl9pPr>
-          </a:lstStyle>
-          <a:p>
-            <a:pPr algn="ctr"/>
-            <a:r>
-              <a:rPr lang="en-US" sz="2800" dirty="0">
-                <a:solidFill>
-                  <a:srgbClr val="FFFF00"/>
-                </a:solidFill>
-                <a:latin typeface="Arial" panose="020B0604020202020204" pitchFamily="34" charset="0"/>
-                <a:cs typeface="Arial" panose="020B0604020202020204" pitchFamily="34" charset="0"/>
-              </a:rPr>
-              <a:t>May benefit applications that use storage for short durations</a:t>
-            </a:r>
-            <a:endParaRPr lang="en-US" sz="2800" b="1" dirty="0">
-              <a:solidFill>
-                <a:srgbClr val="FFC000"/>
-              </a:solidFill>
-              <a:latin typeface="Courier New" panose="02070309020205020404" pitchFamily="49" charset="0"/>
-              <a:cs typeface="Courier New" panose="02070309020205020404" pitchFamily="49" charset="0"/>
-            </a:endParaRPr>
-          </a:p>
-        </p:txBody>
-      </p:sp>
-      <p:sp>
-        <p:nvSpPr>
-          <p:cNvPr id="12" name="TextBox 11"/>
-          <p:cNvSpPr txBox="1"/>
-          <p:nvPr/>
-        </p:nvSpPr>
-        <p:spPr bwMode="auto">
-          <a:xfrm>
-            <a:off x="988381" y="5080000"/>
-            <a:ext cx="5864106" cy="523220"/>
-          </a:xfrm>
-          <a:prstGeom prst="rect">
-            <a:avLst/>
-          </a:prstGeom>
-          <a:solidFill>
-            <a:schemeClr val="bg1"/>
-          </a:solidFill>
-          <a:ln w="76200">
-            <a:solidFill>
-              <a:srgbClr val="FF66FF"/>
-            </a:solidFill>
-            <a:miter lim="800000"/>
-            <a:headEnd/>
-            <a:tailEnd/>
-          </a:ln>
-          <a:effectLst>
-            <a:outerShdw blurRad="50800" dist="38100" dir="2700000" algn="tl" rotWithShape="0">
-              <a:prstClr val="black">
-                <a:alpha val="40000"/>
-              </a:prstClr>
-            </a:outerShdw>
-          </a:effectLst>
-        </p:spPr>
-        <p:txBody>
-          <a:bodyPr wrap="none" rtlCol="0">
-            <a:spAutoFit/>
-          </a:bodyPr>
-          <a:lstStyle>
-            <a:lvl1pPr marL="0" indent="0">
-              <a:defRPr sz="1100">
-                <a:latin typeface="+mn-lt"/>
-                <a:ea typeface="+mn-ea"/>
-                <a:cs typeface="+mn-cs"/>
-              </a:defRPr>
-            </a:lvl1pPr>
-            <a:lvl2pPr marL="457200" indent="0">
-              <a:defRPr sz="1100">
-                <a:latin typeface="+mn-lt"/>
-                <a:ea typeface="+mn-ea"/>
-                <a:cs typeface="+mn-cs"/>
-              </a:defRPr>
-            </a:lvl2pPr>
-            <a:lvl3pPr marL="914400" indent="0">
-              <a:defRPr sz="1100">
-                <a:latin typeface="+mn-lt"/>
-                <a:ea typeface="+mn-ea"/>
-                <a:cs typeface="+mn-cs"/>
-              </a:defRPr>
-            </a:lvl3pPr>
-            <a:lvl4pPr marL="1371600" indent="0">
-              <a:defRPr sz="1100">
-                <a:latin typeface="+mn-lt"/>
-                <a:ea typeface="+mn-ea"/>
-                <a:cs typeface="+mn-cs"/>
-              </a:defRPr>
-            </a:lvl4pPr>
-            <a:lvl5pPr marL="1828800" indent="0">
-              <a:defRPr sz="1100">
-                <a:latin typeface="+mn-lt"/>
-                <a:ea typeface="+mn-ea"/>
-                <a:cs typeface="+mn-cs"/>
-              </a:defRPr>
-            </a:lvl5pPr>
-            <a:lvl6pPr marL="2286000" indent="0">
-              <a:defRPr sz="1100">
-                <a:latin typeface="+mn-lt"/>
-                <a:ea typeface="+mn-ea"/>
-                <a:cs typeface="+mn-cs"/>
-              </a:defRPr>
-            </a:lvl6pPr>
-            <a:lvl7pPr marL="2743200" indent="0">
-              <a:defRPr sz="1100">
-                <a:latin typeface="+mn-lt"/>
-                <a:ea typeface="+mn-ea"/>
-                <a:cs typeface="+mn-cs"/>
-              </a:defRPr>
-            </a:lvl7pPr>
-            <a:lvl8pPr marL="3200400" indent="0">
-              <a:defRPr sz="1100">
-                <a:latin typeface="+mn-lt"/>
-                <a:ea typeface="+mn-ea"/>
-                <a:cs typeface="+mn-cs"/>
-              </a:defRPr>
-            </a:lvl8pPr>
-            <a:lvl9pPr marL="3657600" indent="0">
-              <a:defRPr sz="1100">
-                <a:latin typeface="+mn-lt"/>
-                <a:ea typeface="+mn-ea"/>
-                <a:cs typeface="+mn-cs"/>
-              </a:defRPr>
-            </a:lvl9pPr>
-          </a:lstStyle>
-          <a:p>
-            <a:pPr algn="ctr"/>
-            <a:r>
-              <a:rPr lang="en-US" sz="2800" dirty="0">
-                <a:solidFill>
-                  <a:srgbClr val="FFFF00"/>
-                </a:solidFill>
-                <a:latin typeface="Arial" panose="020B0604020202020204" pitchFamily="34" charset="0"/>
-                <a:cs typeface="Arial" panose="020B0604020202020204" pitchFamily="34" charset="0"/>
-              </a:rPr>
-              <a:t>This proposal still under discussion.</a:t>
-            </a:r>
-          </a:p>
-        </p:txBody>
-      </p:sp>
-    </p:spTree>
-    <p:extLst>
-      <p:ext uri="{BB962C8B-B14F-4D97-AF65-F5344CB8AC3E}">
-        <p14:creationId xmlns:p14="http://schemas.microsoft.com/office/powerpoint/2010/main" val="556057386"/>
-      </p:ext>
-    </p:extLst>
-  </p:cSld>
-  <p:clrMapOvr>
-    <a:masterClrMapping/>
-  </p:clrMapOvr>
-  <p:timing>
-    <p:tnLst>
-      <p:par>
-        <p:cTn id="1" dur="indefinite" restart="never" nodeType="tmRoot">
-          <p:childTnLst>
-            <p:seq concurrent="1" nextAc="seek">
-              <p:cTn id="2" dur="indefinite" nodeType="mainSeq">
-                <p:childTnLst>
-                  <p:par>
-                    <p:cTn id="3" fill="hold">
-                      <p:stCondLst>
-                        <p:cond delay="indefinite"/>
-                      </p:stCondLst>
-                      <p:childTnLst>
-                        <p:par>
-                          <p:cTn id="4" fill="hold">
-                            <p:stCondLst>
-                              <p:cond delay="0"/>
-                            </p:stCondLst>
-                            <p:childTnLst>
-                              <p:par>
-                                <p:cTn id="5" presetID="1" presetClass="entr" presetSubtype="0" fill="hold" grpId="0" nodeType="clickEffect">
-                                  <p:stCondLst>
-                                    <p:cond delay="0"/>
-                                  </p:stCondLst>
-                                  <p:childTnLst>
-                                    <p:set>
-                                      <p:cBhvr>
-                                        <p:cTn id="6" dur="1" fill="hold">
-                                          <p:stCondLst>
-                                            <p:cond delay="0"/>
-                                          </p:stCondLst>
-                                        </p:cTn>
-                                        <p:tgtEl>
-                                          <p:spTgt spid="9"/>
-                                        </p:tgtEl>
-                                        <p:attrNameLst>
-                                          <p:attrName>style.visibility</p:attrName>
-                                        </p:attrNameLst>
-                                      </p:cBhvr>
-                                      <p:to>
-                                        <p:strVal val="visible"/>
-                                      </p:to>
-                                    </p:set>
-                                  </p:childTnLst>
-                                </p:cTn>
-                              </p:par>
-                            </p:childTnLst>
-                          </p:cTn>
-                        </p:par>
-                      </p:childTnLst>
-                    </p:cTn>
-                  </p:par>
-                  <p:par>
-                    <p:cTn id="7" fill="hold">
-                      <p:stCondLst>
-                        <p:cond delay="indefinite"/>
-                      </p:stCondLst>
-                      <p:childTnLst>
-                        <p:par>
-                          <p:cTn id="8" fill="hold">
-                            <p:stCondLst>
-                              <p:cond delay="0"/>
-                            </p:stCondLst>
-                            <p:childTnLst>
-                              <p:par>
-                                <p:cTn id="9" presetID="1" presetClass="entr" presetSubtype="0" fill="hold" grpId="0" nodeType="clickEffect">
-                                  <p:stCondLst>
-                                    <p:cond delay="0"/>
-                                  </p:stCondLst>
-                                  <p:childTnLst>
-                                    <p:set>
-                                      <p:cBhvr>
-                                        <p:cTn id="10" dur="1" fill="hold">
-                                          <p:stCondLst>
-                                            <p:cond delay="0"/>
-                                          </p:stCondLst>
-                                        </p:cTn>
-                                        <p:tgtEl>
-                                          <p:spTgt spid="11"/>
-                                        </p:tgtEl>
-                                        <p:attrNameLst>
-                                          <p:attrName>style.visibility</p:attrName>
-                                        </p:attrNameLst>
-                                      </p:cBhvr>
-                                      <p:to>
-                                        <p:strVal val="visible"/>
-                                      </p:to>
-                                    </p:set>
-                                  </p:childTnLst>
-                                </p:cTn>
-                              </p:par>
-                            </p:childTnLst>
-                          </p:cTn>
-                        </p:par>
-                      </p:childTnLst>
-                    </p:cTn>
-                  </p:par>
-                  <p:par>
-                    <p:cTn id="11" fill="hold">
-                      <p:stCondLst>
-                        <p:cond delay="indefinite"/>
-                      </p:stCondLst>
-                      <p:childTnLst>
-                        <p:par>
-                          <p:cTn id="12" fill="hold">
-                            <p:stCondLst>
-                              <p:cond delay="0"/>
-                            </p:stCondLst>
-                            <p:childTnLst>
-                              <p:par>
-                                <p:cTn id="13" presetID="1" presetClass="entr" presetSubtype="0" fill="hold" grpId="0" nodeType="clickEffect">
-                                  <p:stCondLst>
-                                    <p:cond delay="0"/>
-                                  </p:stCondLst>
-                                  <p:childTnLst>
-                                    <p:set>
-                                      <p:cBhvr>
-                                        <p:cTn id="14" dur="1" fill="hold">
-                                          <p:stCondLst>
-                                            <p:cond delay="0"/>
-                                          </p:stCondLst>
-                                        </p:cTn>
-                                        <p:tgtEl>
-                                          <p:spTgt spid="10"/>
-                                        </p:tgtEl>
-                                        <p:attrNameLst>
-                                          <p:attrName>style.visibility</p:attrName>
-                                        </p:attrNameLst>
-                                      </p:cBhvr>
-                                      <p:to>
-                                        <p:strVal val="visible"/>
-                                      </p:to>
-                                    </p:set>
-                                  </p:childTnLst>
-                                </p:cTn>
-                              </p:par>
-                            </p:childTnLst>
-                          </p:cTn>
-                        </p:par>
-                      </p:childTnLst>
-                    </p:cTn>
-                  </p:par>
-                  <p:par>
-                    <p:cTn id="15" fill="hold">
-                      <p:stCondLst>
-                        <p:cond delay="indefinite"/>
-                      </p:stCondLst>
-                      <p:childTnLst>
-                        <p:par>
-                          <p:cTn id="16" fill="hold">
-                            <p:stCondLst>
-                              <p:cond delay="0"/>
-                            </p:stCondLst>
-                            <p:childTnLst>
-                              <p:par>
-                                <p:cTn id="17" presetID="1" presetClass="entr" presetSubtype="0" fill="hold" grpId="0" nodeType="clickEffect">
-                                  <p:stCondLst>
-                                    <p:cond delay="0"/>
-                                  </p:stCondLst>
-                                  <p:childTnLst>
-                                    <p:set>
-                                      <p:cBhvr>
-                                        <p:cTn id="18" dur="1" fill="hold">
-                                          <p:stCondLst>
-                                            <p:cond delay="0"/>
-                                          </p:stCondLst>
-                                        </p:cTn>
-                                        <p:tgtEl>
-                                          <p:spTgt spid="12"/>
-                                        </p:tgtEl>
-                                        <p:attrNameLst>
-                                          <p:attrName>style.visibility</p:attrName>
-                                        </p:attrNameLst>
-                                      </p:cBhvr>
-                                      <p:to>
-                                        <p:strVal val="visible"/>
-                                      </p:to>
-                                    </p:set>
-                                  </p:childTnLst>
-                                </p:cTn>
-                              </p:par>
-                            </p:childTnLst>
-                          </p:cTn>
-                        </p:par>
-                      </p:childTnLst>
-                    </p:cTn>
-                  </p:par>
-                </p:childTnLst>
-              </p:cTn>
-              <p:prevCondLst>
-                <p:cond evt="onPrev" delay="0">
-                  <p:tgtEl>
-                    <p:sldTgt/>
-                  </p:tgtEl>
-                </p:cond>
-              </p:prevCondLst>
-              <p:nextCondLst>
-                <p:cond evt="onNext" delay="0">
-                  <p:tgtEl>
-                    <p:sldTgt/>
-                  </p:tgtEl>
-                </p:cond>
-              </p:nextCondLst>
-            </p:seq>
-          </p:childTnLst>
-        </p:cTn>
-      </p:par>
-    </p:tnLst>
-    <p:bldLst>
-      <p:bldP spid="9" grpId="0" animBg="1"/>
-      <p:bldP spid="10" grpId="0" animBg="1"/>
-      <p:bldP spid="11" grpId="0" animBg="1"/>
-      <p:bldP spid="12" grpId="0" animBg="1"/>
-    </p:bldLst>
-  </p:timing>
-</p:sld>
-</file>
-
-<file path=ppt/slides/slide69.xml><?xml version="1.0" encoding="utf-8"?>
+<file path=ppt/slides/slide67.xml><?xml version="1.0" encoding="utf-8"?>
 <p:sld xmlns:a="http://schemas.openxmlformats.org/drawingml/2006/main" xmlns:r="http://schemas.openxmlformats.org/officeDocument/2006/relationships" xmlns:p="http://schemas.openxmlformats.org/presentationml/2006/main">
   <p:cSld>
     <p:spTree>
@@ -44890,7 +44530,7 @@
               <a:pPr>
                 <a:defRPr/>
               </a:pPr>
-              <a:t>69</a:t>
+              <a:t>67</a:t>
             </a:fld>
             <a:endParaRPr lang="en-US" dirty="0"/>
           </a:p>
@@ -45631,6 +45271,138 @@
 </p:sld>
 </file>
 
+<file path=ppt/slides/slide68.xml><?xml version="1.0" encoding="utf-8"?>
+<p:sld xmlns:a="http://schemas.openxmlformats.org/drawingml/2006/main" xmlns:r="http://schemas.openxmlformats.org/officeDocument/2006/relationships" xmlns:p="http://schemas.openxmlformats.org/presentationml/2006/main">
+  <p:cSld>
+    <p:spTree>
+      <p:nvGrpSpPr>
+        <p:cNvPr id="1" name=""/>
+        <p:cNvGrpSpPr/>
+        <p:nvPr/>
+      </p:nvGrpSpPr>
+      <p:grpSpPr>
+        <a:xfrm>
+          <a:off x="0" y="0"/>
+          <a:ext cx="0" cy="0"/>
+          <a:chOff x="0" y="0"/>
+          <a:chExt cx="0" cy="0"/>
+        </a:xfrm>
+      </p:grpSpPr>
+      <p:sp>
+        <p:nvSpPr>
+          <p:cNvPr id="2" name="Title 1"/>
+          <p:cNvSpPr>
+            <a:spLocks noGrp="1"/>
+          </p:cNvSpPr>
+          <p:nvPr>
+            <p:ph type="title"/>
+          </p:nvPr>
+        </p:nvSpPr>
+        <p:spPr/>
+        <p:txBody>
+          <a:bodyPr/>
+          <a:lstStyle/>
+          <a:p>
+            <a:endParaRPr lang="en-US" dirty="0"/>
+          </a:p>
+        </p:txBody>
+      </p:sp>
+      <p:sp>
+        <p:nvSpPr>
+          <p:cNvPr id="3" name="Slide Number Placeholder 2"/>
+          <p:cNvSpPr>
+            <a:spLocks noGrp="1"/>
+          </p:cNvSpPr>
+          <p:nvPr>
+            <p:ph type="sldNum" sz="quarter" idx="11"/>
+          </p:nvPr>
+        </p:nvSpPr>
+        <p:spPr/>
+        <p:txBody>
+          <a:bodyPr/>
+          <a:lstStyle/>
+          <a:p>
+            <a:pPr>
+              <a:defRPr/>
+            </a:pPr>
+            <a:fld id="{D65C4E5D-DA99-460E-9E68-E8A28959880C}" type="slidenum">
+              <a:rPr lang="x-none" smtClean="0"/>
+              <a:pPr>
+                <a:defRPr/>
+              </a:pPr>
+              <a:t>68</a:t>
+            </a:fld>
+            <a:endParaRPr lang="en-US" dirty="0"/>
+          </a:p>
+        </p:txBody>
+      </p:sp>
+      <p:pic>
+        <p:nvPicPr>
+          <p:cNvPr id="1029" name="Picture 5"/>
+          <p:cNvPicPr>
+            <a:picLocks noChangeAspect="1" noChangeArrowheads="1"/>
+          </p:cNvPicPr>
+          <p:nvPr/>
+        </p:nvPicPr>
+        <p:blipFill>
+          <a:blip r:embed="rId2">
+            <a:extLst>
+              <a:ext uri="{28A0092B-C50C-407E-A947-70E740481C1C}">
+                <a14:useLocalDpi xmlns:a14="http://schemas.microsoft.com/office/drawing/2010/main" val="0"/>
+              </a:ext>
+            </a:extLst>
+          </a:blip>
+          <a:srcRect/>
+          <a:stretch>
+            <a:fillRect/>
+          </a:stretch>
+        </p:blipFill>
+        <p:spPr bwMode="auto">
+          <a:xfrm>
+            <a:off x="2625725" y="225425"/>
+            <a:ext cx="3892550" cy="6407150"/>
+          </a:xfrm>
+          <a:prstGeom prst="rect">
+            <a:avLst/>
+          </a:prstGeom>
+          <a:noFill/>
+          <a:ln>
+            <a:noFill/>
+          </a:ln>
+          <a:extLst>
+            <a:ext uri="{909E8E84-426E-40DD-AFC4-6F175D3DCCD1}">
+              <a14:hiddenFill xmlns:a14="http://schemas.microsoft.com/office/drawing/2010/main">
+                <a:solidFill>
+                  <a:schemeClr val="accent1"/>
+                </a:solidFill>
+              </a14:hiddenFill>
+            </a:ext>
+            <a:ext uri="{91240B29-F687-4F45-9708-019B960494DF}">
+              <a14:hiddenLine xmlns:a14="http://schemas.microsoft.com/office/drawing/2010/main" w="9525">
+                <a:solidFill>
+                  <a:schemeClr val="tx1"/>
+                </a:solidFill>
+                <a:miter lim="800000"/>
+                <a:headEnd/>
+                <a:tailEnd/>
+              </a14:hiddenLine>
+            </a:ext>
+          </a:extLst>
+        </p:spPr>
+      </p:pic>
+    </p:spTree>
+    <p:extLst>
+      <p:ext uri="{BB962C8B-B14F-4D97-AF65-F5344CB8AC3E}">
+        <p14:creationId xmlns:p14="http://schemas.microsoft.com/office/powerpoint/2010/main" val="97797455"/>
+      </p:ext>
+    </p:extLst>
+  </p:cSld>
+  <p:clrMapOvr>
+    <a:masterClrMapping/>
+  </p:clrMapOvr>
+</p:sld>
+</file>
+
 <file path=ppt/slides/slide7.xml><?xml version="1.0" encoding="utf-8"?>
 <p:sld xmlns:a="http://schemas.openxmlformats.org/drawingml/2006/main" xmlns:r="http://schemas.openxmlformats.org/officeDocument/2006/relationships" xmlns:p="http://schemas.openxmlformats.org/presentationml/2006/main">
   <p:cSld>
@@ -45867,138 +45639,6 @@
     <p:extLst>
       <p:ext uri="{BB962C8B-B14F-4D97-AF65-F5344CB8AC3E}">
         <p14:creationId xmlns:p14="http://schemas.microsoft.com/office/powerpoint/2010/main" val="2530130665"/>
-      </p:ext>
-    </p:extLst>
-  </p:cSld>
-  <p:clrMapOvr>
-    <a:masterClrMapping/>
-  </p:clrMapOvr>
-</p:sld>
-</file>
-
-<file path=ppt/slides/slide70.xml><?xml version="1.0" encoding="utf-8"?>
-<p:sld xmlns:a="http://schemas.openxmlformats.org/drawingml/2006/main" xmlns:r="http://schemas.openxmlformats.org/officeDocument/2006/relationships" xmlns:p="http://schemas.openxmlformats.org/presentationml/2006/main">
-  <p:cSld>
-    <p:spTree>
-      <p:nvGrpSpPr>
-        <p:cNvPr id="1" name=""/>
-        <p:cNvGrpSpPr/>
-        <p:nvPr/>
-      </p:nvGrpSpPr>
-      <p:grpSpPr>
-        <a:xfrm>
-          <a:off x="0" y="0"/>
-          <a:ext cx="0" cy="0"/>
-          <a:chOff x="0" y="0"/>
-          <a:chExt cx="0" cy="0"/>
-        </a:xfrm>
-      </p:grpSpPr>
-      <p:sp>
-        <p:nvSpPr>
-          <p:cNvPr id="2" name="Title 1"/>
-          <p:cNvSpPr>
-            <a:spLocks noGrp="1"/>
-          </p:cNvSpPr>
-          <p:nvPr>
-            <p:ph type="title"/>
-          </p:nvPr>
-        </p:nvSpPr>
-        <p:spPr/>
-        <p:txBody>
-          <a:bodyPr/>
-          <a:lstStyle/>
-          <a:p>
-            <a:endParaRPr lang="en-US" dirty="0"/>
-          </a:p>
-        </p:txBody>
-      </p:sp>
-      <p:sp>
-        <p:nvSpPr>
-          <p:cNvPr id="3" name="Slide Number Placeholder 2"/>
-          <p:cNvSpPr>
-            <a:spLocks noGrp="1"/>
-          </p:cNvSpPr>
-          <p:nvPr>
-            <p:ph type="sldNum" sz="quarter" idx="11"/>
-          </p:nvPr>
-        </p:nvSpPr>
-        <p:spPr/>
-        <p:txBody>
-          <a:bodyPr/>
-          <a:lstStyle/>
-          <a:p>
-            <a:pPr>
-              <a:defRPr/>
-            </a:pPr>
-            <a:fld id="{D65C4E5D-DA99-460E-9E68-E8A28959880C}" type="slidenum">
-              <a:rPr lang="x-none" smtClean="0"/>
-              <a:pPr>
-                <a:defRPr/>
-              </a:pPr>
-              <a:t>70</a:t>
-            </a:fld>
-            <a:endParaRPr lang="en-US" dirty="0"/>
-          </a:p>
-        </p:txBody>
-      </p:sp>
-      <p:pic>
-        <p:nvPicPr>
-          <p:cNvPr id="1029" name="Picture 5"/>
-          <p:cNvPicPr>
-            <a:picLocks noChangeAspect="1" noChangeArrowheads="1"/>
-          </p:cNvPicPr>
-          <p:nvPr/>
-        </p:nvPicPr>
-        <p:blipFill>
-          <a:blip r:embed="rId2">
-            <a:extLst>
-              <a:ext uri="{28A0092B-C50C-407E-A947-70E740481C1C}">
-                <a14:useLocalDpi xmlns:a14="http://schemas.microsoft.com/office/drawing/2010/main" val="0"/>
-              </a:ext>
-            </a:extLst>
-          </a:blip>
-          <a:srcRect/>
-          <a:stretch>
-            <a:fillRect/>
-          </a:stretch>
-        </p:blipFill>
-        <p:spPr bwMode="auto">
-          <a:xfrm>
-            <a:off x="2625725" y="225425"/>
-            <a:ext cx="3892550" cy="6407150"/>
-          </a:xfrm>
-          <a:prstGeom prst="rect">
-            <a:avLst/>
-          </a:prstGeom>
-          <a:noFill/>
-          <a:ln>
-            <a:noFill/>
-          </a:ln>
-          <a:extLst>
-            <a:ext uri="{909E8E84-426E-40DD-AFC4-6F175D3DCCD1}">
-              <a14:hiddenFill xmlns:a14="http://schemas.microsoft.com/office/drawing/2010/main">
-                <a:solidFill>
-                  <a:schemeClr val="accent1"/>
-                </a:solidFill>
-              </a14:hiddenFill>
-            </a:ext>
-            <a:ext uri="{91240B29-F687-4F45-9708-019B960494DF}">
-              <a14:hiddenLine xmlns:a14="http://schemas.microsoft.com/office/drawing/2010/main" w="9525">
-                <a:solidFill>
-                  <a:schemeClr val="tx1"/>
-                </a:solidFill>
-                <a:miter lim="800000"/>
-                <a:headEnd/>
-                <a:tailEnd/>
-              </a14:hiddenLine>
-            </a:ext>
-          </a:extLst>
-        </p:spPr>
-      </p:pic>
-    </p:spTree>
-    <p:extLst>
-      <p:ext uri="{BB962C8B-B14F-4D97-AF65-F5344CB8AC3E}">
-        <p14:creationId xmlns:p14="http://schemas.microsoft.com/office/powerpoint/2010/main" val="97797455"/>
       </p:ext>
     </p:extLst>
   </p:cSld>

</xml_diff>